<commit_message>
Completed Section 13, updated daily log with learnings and also updated documentation in powerpoint
</commit_message>
<xml_diff>
--- a/python-coding-framework-diagrams-and-documentation.pptx
+++ b/python-coding-framework-diagrams-and-documentation.pptx
@@ -8,7 +8,7 @@
     <p:sldMasterId id="2147483674" r:id="rId4"/>
   </p:sldMasterIdLst>
   <p:notesMasterIdLst>
-    <p:notesMasterId r:id="rId10"/>
+    <p:notesMasterId r:id="rId14"/>
   </p:notesMasterIdLst>
   <p:sldIdLst>
     <p:sldId id="301" r:id="rId5"/>
@@ -16,6 +16,10 @@
     <p:sldId id="310" r:id="rId7"/>
     <p:sldId id="344" r:id="rId8"/>
     <p:sldId id="343" r:id="rId9"/>
+    <p:sldId id="345" r:id="rId10"/>
+    <p:sldId id="346" r:id="rId11"/>
+    <p:sldId id="347" r:id="rId12"/>
+    <p:sldId id="348" r:id="rId13"/>
   </p:sldIdLst>
   <p:sldSz cx="12192000" cy="6858000"/>
   <p:notesSz cx="6889750" cy="10021888"/>
@@ -204,7 +208,7 @@
           <a:p>
             <a:fld id="{0D2BE958-CCE6-4EBA-9C92-EAE784A9D90D}" type="datetimeFigureOut">
               <a:rPr lang="en-GB" smtClean="0"/>
-              <a:t>19/07/2022</a:t>
+              <a:t>25/07/2022</a:t>
             </a:fld>
             <a:endParaRPr lang="en-GB"/>
           </a:p>
@@ -1899,7 +1903,7 @@
             <a:fld id="{1CBE1E4D-7CC0-45A9-A56C-EF1CE89C88B7}" type="datetimeFigureOut">
               <a:rPr lang="en-GB" smtClean="0"/>
               <a:pPr/>
-              <a:t>19/07/2022</a:t>
+              <a:t>25/07/2022</a:t>
             </a:fld>
             <a:endParaRPr lang="en-GB"/>
           </a:p>
@@ -3421,7 +3425,7 @@
           <a:p>
             <a:fld id="{D3D47D9D-6331-42FA-BA57-EFFB8A18CF9C}" type="datetime1">
               <a:rPr lang="en-GB" smtClean="0"/>
-              <a:t>19/07/2022</a:t>
+              <a:t>25/07/2022</a:t>
             </a:fld>
             <a:endParaRPr lang="en-GB" dirty="0"/>
           </a:p>
@@ -6787,6 +6791,13 @@
               <a:rPr lang="en-GB" dirty="0"/>
               <a:t>Section 3</a:t>
             </a:r>
+            <a:br>
+              <a:rPr lang="en-GB" dirty="0"/>
+            </a:br>
+            <a:r>
+              <a:rPr lang="en-GB" dirty="0"/>
+              <a:t>Code Structure</a:t>
+            </a:r>
           </a:p>
         </p:txBody>
       </p:sp>
@@ -10970,6 +10981,2262 @@
     <p:extLst>
       <p:ext uri="{BB962C8B-B14F-4D97-AF65-F5344CB8AC3E}">
         <p14:creationId xmlns:p14="http://schemas.microsoft.com/office/powerpoint/2010/main" val="601819742"/>
+      </p:ext>
+    </p:extLst>
+  </p:cSld>
+  <p:clrMapOvr>
+    <a:masterClrMapping/>
+  </p:clrMapOvr>
+</p:sld>
+</file>
+
+<file path=ppt/slides/slide6.xml><?xml version="1.0" encoding="utf-8"?>
+<p:sld xmlns:a="http://schemas.openxmlformats.org/drawingml/2006/main" xmlns:r="http://schemas.openxmlformats.org/officeDocument/2006/relationships" xmlns:p="http://schemas.openxmlformats.org/presentationml/2006/main">
+  <p:cSld>
+    <p:spTree>
+      <p:nvGrpSpPr>
+        <p:cNvPr id="1" name=""/>
+        <p:cNvGrpSpPr/>
+        <p:nvPr/>
+      </p:nvGrpSpPr>
+      <p:grpSpPr>
+        <a:xfrm>
+          <a:off x="0" y="0"/>
+          <a:ext cx="0" cy="0"/>
+          <a:chOff x="0" y="0"/>
+          <a:chExt cx="0" cy="0"/>
+        </a:xfrm>
+      </p:grpSpPr>
+      <p:sp>
+        <p:nvSpPr>
+          <p:cNvPr id="4" name="Title 3">
+            <a:extLst>
+              <a:ext uri="{FF2B5EF4-FFF2-40B4-BE49-F238E27FC236}">
+                <a16:creationId xmlns:a16="http://schemas.microsoft.com/office/drawing/2014/main" id="{6D583DCD-5CC9-474B-93D8-D8C61A9A540F}"/>
+              </a:ext>
+            </a:extLst>
+          </p:cNvPr>
+          <p:cNvSpPr>
+            <a:spLocks noGrp="1"/>
+          </p:cNvSpPr>
+          <p:nvPr>
+            <p:ph type="ctrTitle"/>
+          </p:nvPr>
+        </p:nvSpPr>
+        <p:spPr/>
+        <p:txBody>
+          <a:bodyPr/>
+          <a:lstStyle/>
+          <a:p>
+            <a:pPr algn="ctr"/>
+            <a:r>
+              <a:rPr lang="en-GB" dirty="0"/>
+              <a:t>Section 3</a:t>
+            </a:r>
+            <a:br>
+              <a:rPr lang="en-GB" dirty="0"/>
+            </a:br>
+            <a:r>
+              <a:rPr lang="en-GB" dirty="0"/>
+              <a:t>Config</a:t>
+            </a:r>
+          </a:p>
+        </p:txBody>
+      </p:sp>
+      <p:sp>
+        <p:nvSpPr>
+          <p:cNvPr id="12" name="Subtitle 11">
+            <a:extLst>
+              <a:ext uri="{FF2B5EF4-FFF2-40B4-BE49-F238E27FC236}">
+                <a16:creationId xmlns:a16="http://schemas.microsoft.com/office/drawing/2014/main" id="{03E3B662-38F8-469C-B005-7D2D5F1C2191}"/>
+              </a:ext>
+            </a:extLst>
+          </p:cNvPr>
+          <p:cNvSpPr>
+            <a:spLocks noGrp="1"/>
+          </p:cNvSpPr>
+          <p:nvPr>
+            <p:ph type="subTitle" idx="1"/>
+          </p:nvPr>
+        </p:nvSpPr>
+        <p:spPr>
+          <a:xfrm>
+            <a:off x="5316278" y="2568196"/>
+            <a:ext cx="5981250" cy="1815268"/>
+          </a:xfrm>
+        </p:spPr>
+        <p:txBody>
+          <a:bodyPr/>
+          <a:lstStyle/>
+          <a:p>
+            <a:r>
+              <a:rPr lang="en-GB" dirty="0">
+                <a:solidFill>
+                  <a:schemeClr val="tx1"/>
+                </a:solidFill>
+              </a:rPr>
+              <a:t>11. Logging using basic Config</a:t>
+            </a:r>
+          </a:p>
+          <a:p>
+            <a:r>
+              <a:rPr lang="en-GB" dirty="0">
+                <a:solidFill>
+                  <a:schemeClr val="tx1"/>
+                </a:solidFill>
+              </a:rPr>
+              <a:t>12. Logging using a file Config</a:t>
+            </a:r>
+          </a:p>
+        </p:txBody>
+      </p:sp>
+    </p:spTree>
+    <p:extLst>
+      <p:ext uri="{BB962C8B-B14F-4D97-AF65-F5344CB8AC3E}">
+        <p14:creationId xmlns:p14="http://schemas.microsoft.com/office/powerpoint/2010/main" val="1139470348"/>
+      </p:ext>
+    </p:extLst>
+  </p:cSld>
+  <p:clrMapOvr>
+    <a:masterClrMapping/>
+  </p:clrMapOvr>
+</p:sld>
+</file>
+
+<file path=ppt/slides/slide7.xml><?xml version="1.0" encoding="utf-8"?>
+<p:sld xmlns:a="http://schemas.openxmlformats.org/drawingml/2006/main" xmlns:r="http://schemas.openxmlformats.org/officeDocument/2006/relationships" xmlns:p="http://schemas.openxmlformats.org/presentationml/2006/main">
+  <p:cSld>
+    <p:spTree>
+      <p:nvGrpSpPr>
+        <p:cNvPr id="1" name=""/>
+        <p:cNvGrpSpPr/>
+        <p:nvPr/>
+      </p:nvGrpSpPr>
+      <p:grpSpPr>
+        <a:xfrm>
+          <a:off x="0" y="0"/>
+          <a:ext cx="0" cy="0"/>
+          <a:chOff x="0" y="0"/>
+          <a:chExt cx="0" cy="0"/>
+        </a:xfrm>
+      </p:grpSpPr>
+      <p:sp>
+        <p:nvSpPr>
+          <p:cNvPr id="2" name="Title 1">
+            <a:extLst>
+              <a:ext uri="{FF2B5EF4-FFF2-40B4-BE49-F238E27FC236}">
+                <a16:creationId xmlns:a16="http://schemas.microsoft.com/office/drawing/2014/main" id="{0BA0FD34-A679-490F-945A-CC620CFEECB3}"/>
+              </a:ext>
+            </a:extLst>
+          </p:cNvPr>
+          <p:cNvSpPr>
+            <a:spLocks noGrp="1"/>
+          </p:cNvSpPr>
+          <p:nvPr>
+            <p:ph type="title"/>
+          </p:nvPr>
+        </p:nvSpPr>
+        <p:spPr/>
+        <p:txBody>
+          <a:bodyPr/>
+          <a:lstStyle/>
+          <a:p>
+            <a:r>
+              <a:rPr lang="en-GB" dirty="0"/>
+              <a:t>Section 3</a:t>
+            </a:r>
+          </a:p>
+        </p:txBody>
+      </p:sp>
+      <p:sp>
+        <p:nvSpPr>
+          <p:cNvPr id="6" name="Content Placeholder 5">
+            <a:extLst>
+              <a:ext uri="{FF2B5EF4-FFF2-40B4-BE49-F238E27FC236}">
+                <a16:creationId xmlns:a16="http://schemas.microsoft.com/office/drawing/2014/main" id="{6784FF90-B334-B589-76D8-FECF2F831659}"/>
+              </a:ext>
+            </a:extLst>
+          </p:cNvPr>
+          <p:cNvSpPr>
+            <a:spLocks noGrp="1"/>
+          </p:cNvSpPr>
+          <p:nvPr>
+            <p:ph idx="1"/>
+          </p:nvPr>
+        </p:nvSpPr>
+        <p:spPr>
+          <a:xfrm>
+            <a:off x="1194355" y="1212115"/>
+            <a:ext cx="4901645" cy="4629153"/>
+          </a:xfrm>
+        </p:spPr>
+        <p:txBody>
+          <a:bodyPr/>
+          <a:lstStyle/>
+          <a:p>
+            <a:r>
+              <a:rPr lang="en-GB" dirty="0"/>
+              <a:t>Config Levels</a:t>
+            </a:r>
+          </a:p>
+          <a:p>
+            <a:pPr lvl="1"/>
+            <a:r>
+              <a:rPr lang="en-GB" dirty="0"/>
+              <a:t>Debug</a:t>
+            </a:r>
+          </a:p>
+          <a:p>
+            <a:pPr lvl="1"/>
+            <a:r>
+              <a:rPr lang="en-GB" dirty="0"/>
+              <a:t>Info</a:t>
+            </a:r>
+          </a:p>
+          <a:p>
+            <a:pPr lvl="1"/>
+            <a:r>
+              <a:rPr lang="en-GB" dirty="0"/>
+              <a:t>Warning – default level</a:t>
+            </a:r>
+          </a:p>
+          <a:p>
+            <a:pPr lvl="1"/>
+            <a:r>
+              <a:rPr lang="en-GB" dirty="0"/>
+              <a:t>Error</a:t>
+            </a:r>
+          </a:p>
+          <a:p>
+            <a:r>
+              <a:rPr lang="en-GB" dirty="0"/>
+              <a:t>Set new level</a:t>
+            </a:r>
+          </a:p>
+          <a:p>
+            <a:pPr lvl="1"/>
+            <a:r>
+              <a:rPr lang="en-GB" sz="1800" dirty="0" err="1">
+                <a:latin typeface="Courier New" panose="02070309020205020404" pitchFamily="49" charset="0"/>
+                <a:cs typeface="Courier New" panose="02070309020205020404" pitchFamily="49" charset="0"/>
+              </a:rPr>
+              <a:t>Logging.basicConfig</a:t>
+            </a:r>
+            <a:r>
+              <a:rPr lang="en-GB" sz="1800" dirty="0">
+                <a:latin typeface="Courier New" panose="02070309020205020404" pitchFamily="49" charset="0"/>
+                <a:cs typeface="Courier New" panose="02070309020205020404" pitchFamily="49" charset="0"/>
+              </a:rPr>
+              <a:t>(level = “DEBUG”)</a:t>
+            </a:r>
+          </a:p>
+          <a:p>
+            <a:pPr marL="0" indent="0">
+              <a:buNone/>
+            </a:pPr>
+            <a:endParaRPr lang="en-GB" sz="2200" dirty="0">
+              <a:latin typeface="Courier New" panose="02070309020205020404" pitchFamily="49" charset="0"/>
+              <a:cs typeface="Courier New" panose="02070309020205020404" pitchFamily="49" charset="0"/>
+            </a:endParaRPr>
+          </a:p>
+        </p:txBody>
+      </p:sp>
+      <p:sp>
+        <p:nvSpPr>
+          <p:cNvPr id="5" name="Subtitle 12">
+            <a:extLst>
+              <a:ext uri="{FF2B5EF4-FFF2-40B4-BE49-F238E27FC236}">
+                <a16:creationId xmlns:a16="http://schemas.microsoft.com/office/drawing/2014/main" id="{4056444F-3519-490C-9979-73BA18929113}"/>
+              </a:ext>
+            </a:extLst>
+          </p:cNvPr>
+          <p:cNvSpPr txBox="1">
+            <a:spLocks/>
+          </p:cNvSpPr>
+          <p:nvPr/>
+        </p:nvSpPr>
+        <p:spPr>
+          <a:xfrm>
+            <a:off x="5200650" y="351954"/>
+            <a:ext cx="6121772" cy="387271"/>
+          </a:xfrm>
+          <a:prstGeom prst="rect">
+            <a:avLst/>
+          </a:prstGeom>
+        </p:spPr>
+        <p:txBody>
+          <a:bodyPr/>
+          <a:lstStyle>
+            <a:lvl1pPr marL="228600" indent="-228600" algn="l" defTabSz="914400" rtl="0" eaLnBrk="1" latinLnBrk="0" hangingPunct="1">
+              <a:lnSpc>
+                <a:spcPct val="90000"/>
+              </a:lnSpc>
+              <a:spcBef>
+                <a:spcPts val="1000"/>
+              </a:spcBef>
+              <a:buClr>
+                <a:srgbClr val="34B6B8"/>
+              </a:buClr>
+              <a:buFont typeface="Wingdings" panose="05000000000000000000" pitchFamily="2" charset="2"/>
+              <a:buChar char="§"/>
+              <a:defRPr sz="2800" kern="1200">
+                <a:solidFill>
+                  <a:schemeClr val="tx1"/>
+                </a:solidFill>
+                <a:latin typeface="Abadi Extra Light" panose="020B0204020104020204" pitchFamily="34" charset="0"/>
+                <a:ea typeface="+mn-ea"/>
+                <a:cs typeface="+mn-cs"/>
+              </a:defRPr>
+            </a:lvl1pPr>
+            <a:lvl2pPr marL="685800" indent="-228600" algn="l" defTabSz="914400" rtl="0" eaLnBrk="1" latinLnBrk="0" hangingPunct="1">
+              <a:lnSpc>
+                <a:spcPct val="90000"/>
+              </a:lnSpc>
+              <a:spcBef>
+                <a:spcPts val="500"/>
+              </a:spcBef>
+              <a:buClr>
+                <a:srgbClr val="34B6B8"/>
+              </a:buClr>
+              <a:buFont typeface="Wingdings" panose="05000000000000000000" pitchFamily="2" charset="2"/>
+              <a:buChar char="§"/>
+              <a:defRPr sz="2400" kern="1200">
+                <a:solidFill>
+                  <a:schemeClr val="tx1"/>
+                </a:solidFill>
+                <a:latin typeface="Abadi Extra Light" panose="020B0204020104020204" pitchFamily="34" charset="0"/>
+                <a:ea typeface="+mn-ea"/>
+                <a:cs typeface="+mn-cs"/>
+              </a:defRPr>
+            </a:lvl2pPr>
+            <a:lvl3pPr marL="1143000" indent="-228600" algn="l" defTabSz="914400" rtl="0" eaLnBrk="1" latinLnBrk="0" hangingPunct="1">
+              <a:lnSpc>
+                <a:spcPct val="90000"/>
+              </a:lnSpc>
+              <a:spcBef>
+                <a:spcPts val="500"/>
+              </a:spcBef>
+              <a:buClr>
+                <a:srgbClr val="34B6B8"/>
+              </a:buClr>
+              <a:buFont typeface="Wingdings" panose="05000000000000000000" pitchFamily="2" charset="2"/>
+              <a:buChar char="§"/>
+              <a:defRPr sz="2000" kern="1200">
+                <a:solidFill>
+                  <a:schemeClr val="tx1"/>
+                </a:solidFill>
+                <a:latin typeface="Abadi Extra Light" panose="020B0204020104020204" pitchFamily="34" charset="0"/>
+                <a:ea typeface="+mn-ea"/>
+                <a:cs typeface="+mn-cs"/>
+              </a:defRPr>
+            </a:lvl3pPr>
+            <a:lvl4pPr marL="1600200" indent="-228600" algn="l" defTabSz="914400" rtl="0" eaLnBrk="1" latinLnBrk="0" hangingPunct="1">
+              <a:lnSpc>
+                <a:spcPct val="90000"/>
+              </a:lnSpc>
+              <a:spcBef>
+                <a:spcPts val="500"/>
+              </a:spcBef>
+              <a:buClr>
+                <a:srgbClr val="34B6B8"/>
+              </a:buClr>
+              <a:buFont typeface="Wingdings" panose="05000000000000000000" pitchFamily="2" charset="2"/>
+              <a:buChar char="§"/>
+              <a:defRPr sz="1800" kern="1200">
+                <a:solidFill>
+                  <a:schemeClr val="tx1"/>
+                </a:solidFill>
+                <a:latin typeface="Abadi Extra Light" panose="020B0204020104020204" pitchFamily="34" charset="0"/>
+                <a:ea typeface="+mn-ea"/>
+                <a:cs typeface="+mn-cs"/>
+              </a:defRPr>
+            </a:lvl4pPr>
+            <a:lvl5pPr marL="2057400" indent="-228600" algn="l" defTabSz="914400" rtl="0" eaLnBrk="1" latinLnBrk="0" hangingPunct="1">
+              <a:lnSpc>
+                <a:spcPct val="90000"/>
+              </a:lnSpc>
+              <a:spcBef>
+                <a:spcPts val="500"/>
+              </a:spcBef>
+              <a:buClr>
+                <a:srgbClr val="34B6B8"/>
+              </a:buClr>
+              <a:buFont typeface="Wingdings" panose="05000000000000000000" pitchFamily="2" charset="2"/>
+              <a:buChar char="§"/>
+              <a:defRPr sz="1800" kern="1200">
+                <a:solidFill>
+                  <a:schemeClr val="tx1"/>
+                </a:solidFill>
+                <a:latin typeface="Abadi Extra Light" panose="020B0204020104020204" pitchFamily="34" charset="0"/>
+                <a:ea typeface="+mn-ea"/>
+                <a:cs typeface="+mn-cs"/>
+              </a:defRPr>
+            </a:lvl5pPr>
+            <a:lvl6pPr marL="2514600" indent="-228600" algn="l" defTabSz="914400" rtl="0" eaLnBrk="1" latinLnBrk="0" hangingPunct="1">
+              <a:lnSpc>
+                <a:spcPct val="90000"/>
+              </a:lnSpc>
+              <a:spcBef>
+                <a:spcPts val="500"/>
+              </a:spcBef>
+              <a:buFont typeface="Arial" panose="020B0604020202020204" pitchFamily="34" charset="0"/>
+              <a:buChar char="•"/>
+              <a:defRPr sz="1800" kern="1200">
+                <a:solidFill>
+                  <a:schemeClr val="tx1"/>
+                </a:solidFill>
+                <a:latin typeface="+mn-lt"/>
+                <a:ea typeface="+mn-ea"/>
+                <a:cs typeface="+mn-cs"/>
+              </a:defRPr>
+            </a:lvl6pPr>
+            <a:lvl7pPr marL="2971800" indent="-228600" algn="l" defTabSz="914400" rtl="0" eaLnBrk="1" latinLnBrk="0" hangingPunct="1">
+              <a:lnSpc>
+                <a:spcPct val="90000"/>
+              </a:lnSpc>
+              <a:spcBef>
+                <a:spcPts val="500"/>
+              </a:spcBef>
+              <a:buFont typeface="Arial" panose="020B0604020202020204" pitchFamily="34" charset="0"/>
+              <a:buChar char="•"/>
+              <a:defRPr sz="1800" kern="1200">
+                <a:solidFill>
+                  <a:schemeClr val="tx1"/>
+                </a:solidFill>
+                <a:latin typeface="+mn-lt"/>
+                <a:ea typeface="+mn-ea"/>
+                <a:cs typeface="+mn-cs"/>
+              </a:defRPr>
+            </a:lvl7pPr>
+            <a:lvl8pPr marL="3429000" indent="-228600" algn="l" defTabSz="914400" rtl="0" eaLnBrk="1" latinLnBrk="0" hangingPunct="1">
+              <a:lnSpc>
+                <a:spcPct val="90000"/>
+              </a:lnSpc>
+              <a:spcBef>
+                <a:spcPts val="500"/>
+              </a:spcBef>
+              <a:buFont typeface="Arial" panose="020B0604020202020204" pitchFamily="34" charset="0"/>
+              <a:buChar char="•"/>
+              <a:defRPr sz="1800" kern="1200">
+                <a:solidFill>
+                  <a:schemeClr val="tx1"/>
+                </a:solidFill>
+                <a:latin typeface="+mn-lt"/>
+                <a:ea typeface="+mn-ea"/>
+                <a:cs typeface="+mn-cs"/>
+              </a:defRPr>
+            </a:lvl8pPr>
+            <a:lvl9pPr marL="3886200" indent="-228600" algn="l" defTabSz="914400" rtl="0" eaLnBrk="1" latinLnBrk="0" hangingPunct="1">
+              <a:lnSpc>
+                <a:spcPct val="90000"/>
+              </a:lnSpc>
+              <a:spcBef>
+                <a:spcPts val="500"/>
+              </a:spcBef>
+              <a:buFont typeface="Arial" panose="020B0604020202020204" pitchFamily="34" charset="0"/>
+              <a:buChar char="•"/>
+              <a:defRPr sz="1800" kern="1200">
+                <a:solidFill>
+                  <a:schemeClr val="tx1"/>
+                </a:solidFill>
+                <a:latin typeface="+mn-lt"/>
+                <a:ea typeface="+mn-ea"/>
+                <a:cs typeface="+mn-cs"/>
+              </a:defRPr>
+            </a:lvl9pPr>
+          </a:lstStyle>
+          <a:p>
+            <a:pPr marL="0" indent="0" algn="r">
+              <a:buNone/>
+            </a:pPr>
+            <a:r>
+              <a:rPr lang="en-GB" sz="2400" dirty="0">
+                <a:solidFill>
+                  <a:srgbClr val="A6A7A7"/>
+                </a:solidFill>
+              </a:rPr>
+              <a:t>11/12. Initializing and Logging using basic config</a:t>
+            </a:r>
+          </a:p>
+        </p:txBody>
+      </p:sp>
+      <p:sp>
+        <p:nvSpPr>
+          <p:cNvPr id="41" name="Content Placeholder 5">
+            <a:extLst>
+              <a:ext uri="{FF2B5EF4-FFF2-40B4-BE49-F238E27FC236}">
+                <a16:creationId xmlns:a16="http://schemas.microsoft.com/office/drawing/2014/main" id="{07528D3D-FC21-C9FE-4AB2-41ED3B40D5FB}"/>
+              </a:ext>
+            </a:extLst>
+          </p:cNvPr>
+          <p:cNvSpPr txBox="1">
+            <a:spLocks/>
+          </p:cNvSpPr>
+          <p:nvPr/>
+        </p:nvSpPr>
+        <p:spPr>
+          <a:xfrm>
+            <a:off x="6699340" y="1212115"/>
+            <a:ext cx="4901645" cy="4629153"/>
+          </a:xfrm>
+          <a:prstGeom prst="rect">
+            <a:avLst/>
+          </a:prstGeom>
+        </p:spPr>
+        <p:txBody>
+          <a:bodyPr/>
+          <a:lstStyle>
+            <a:lvl1pPr marL="228600" indent="-228600" algn="l" defTabSz="914400" rtl="0" eaLnBrk="1" latinLnBrk="0" hangingPunct="1">
+              <a:lnSpc>
+                <a:spcPct val="90000"/>
+              </a:lnSpc>
+              <a:spcBef>
+                <a:spcPts val="1000"/>
+              </a:spcBef>
+              <a:buClr>
+                <a:srgbClr val="34B6B8"/>
+              </a:buClr>
+              <a:buFont typeface="Wingdings" panose="05000000000000000000" pitchFamily="2" charset="2"/>
+              <a:buChar char="§"/>
+              <a:defRPr sz="2800" kern="1200">
+                <a:solidFill>
+                  <a:schemeClr val="tx1"/>
+                </a:solidFill>
+                <a:latin typeface="Abadi Extra Light" panose="020B0204020104020204" pitchFamily="34" charset="0"/>
+                <a:ea typeface="+mn-ea"/>
+                <a:cs typeface="+mn-cs"/>
+              </a:defRPr>
+            </a:lvl1pPr>
+            <a:lvl2pPr marL="685800" indent="-228600" algn="l" defTabSz="914400" rtl="0" eaLnBrk="1" latinLnBrk="0" hangingPunct="1">
+              <a:lnSpc>
+                <a:spcPct val="90000"/>
+              </a:lnSpc>
+              <a:spcBef>
+                <a:spcPts val="500"/>
+              </a:spcBef>
+              <a:buClr>
+                <a:srgbClr val="34B6B8"/>
+              </a:buClr>
+              <a:buFont typeface="Wingdings" panose="05000000000000000000" pitchFamily="2" charset="2"/>
+              <a:buChar char="§"/>
+              <a:defRPr sz="2400" kern="1200">
+                <a:solidFill>
+                  <a:schemeClr val="tx1"/>
+                </a:solidFill>
+                <a:latin typeface="Abadi Extra Light" panose="020B0204020104020204" pitchFamily="34" charset="0"/>
+                <a:ea typeface="+mn-ea"/>
+                <a:cs typeface="+mn-cs"/>
+              </a:defRPr>
+            </a:lvl2pPr>
+            <a:lvl3pPr marL="1143000" indent="-228600" algn="l" defTabSz="914400" rtl="0" eaLnBrk="1" latinLnBrk="0" hangingPunct="1">
+              <a:lnSpc>
+                <a:spcPct val="90000"/>
+              </a:lnSpc>
+              <a:spcBef>
+                <a:spcPts val="500"/>
+              </a:spcBef>
+              <a:buClr>
+                <a:srgbClr val="34B6B8"/>
+              </a:buClr>
+              <a:buFont typeface="Wingdings" panose="05000000000000000000" pitchFamily="2" charset="2"/>
+              <a:buChar char="§"/>
+              <a:defRPr sz="2000" kern="1200">
+                <a:solidFill>
+                  <a:schemeClr val="tx1"/>
+                </a:solidFill>
+                <a:latin typeface="Abadi Extra Light" panose="020B0204020104020204" pitchFamily="34" charset="0"/>
+                <a:ea typeface="+mn-ea"/>
+                <a:cs typeface="+mn-cs"/>
+              </a:defRPr>
+            </a:lvl3pPr>
+            <a:lvl4pPr marL="1600200" indent="-228600" algn="l" defTabSz="914400" rtl="0" eaLnBrk="1" latinLnBrk="0" hangingPunct="1">
+              <a:lnSpc>
+                <a:spcPct val="90000"/>
+              </a:lnSpc>
+              <a:spcBef>
+                <a:spcPts val="500"/>
+              </a:spcBef>
+              <a:buClr>
+                <a:srgbClr val="34B6B8"/>
+              </a:buClr>
+              <a:buFont typeface="Wingdings" panose="05000000000000000000" pitchFamily="2" charset="2"/>
+              <a:buChar char="§"/>
+              <a:defRPr sz="1800" kern="1200">
+                <a:solidFill>
+                  <a:schemeClr val="tx1"/>
+                </a:solidFill>
+                <a:latin typeface="Abadi Extra Light" panose="020B0204020104020204" pitchFamily="34" charset="0"/>
+                <a:ea typeface="+mn-ea"/>
+                <a:cs typeface="+mn-cs"/>
+              </a:defRPr>
+            </a:lvl4pPr>
+            <a:lvl5pPr marL="2057400" indent="-228600" algn="l" defTabSz="914400" rtl="0" eaLnBrk="1" latinLnBrk="0" hangingPunct="1">
+              <a:lnSpc>
+                <a:spcPct val="90000"/>
+              </a:lnSpc>
+              <a:spcBef>
+                <a:spcPts val="500"/>
+              </a:spcBef>
+              <a:buClr>
+                <a:srgbClr val="34B6B8"/>
+              </a:buClr>
+              <a:buFont typeface="Wingdings" panose="05000000000000000000" pitchFamily="2" charset="2"/>
+              <a:buChar char="§"/>
+              <a:defRPr sz="1800" kern="1200">
+                <a:solidFill>
+                  <a:schemeClr val="tx1"/>
+                </a:solidFill>
+                <a:latin typeface="Abadi Extra Light" panose="020B0204020104020204" pitchFamily="34" charset="0"/>
+                <a:ea typeface="+mn-ea"/>
+                <a:cs typeface="+mn-cs"/>
+              </a:defRPr>
+            </a:lvl5pPr>
+            <a:lvl6pPr marL="2514600" indent="-228600" algn="l" defTabSz="914400" rtl="0" eaLnBrk="1" latinLnBrk="0" hangingPunct="1">
+              <a:lnSpc>
+                <a:spcPct val="90000"/>
+              </a:lnSpc>
+              <a:spcBef>
+                <a:spcPts val="500"/>
+              </a:spcBef>
+              <a:buFont typeface="Arial" panose="020B0604020202020204" pitchFamily="34" charset="0"/>
+              <a:buChar char="•"/>
+              <a:defRPr sz="1800" kern="1200">
+                <a:solidFill>
+                  <a:schemeClr val="tx1"/>
+                </a:solidFill>
+                <a:latin typeface="+mn-lt"/>
+                <a:ea typeface="+mn-ea"/>
+                <a:cs typeface="+mn-cs"/>
+              </a:defRPr>
+            </a:lvl6pPr>
+            <a:lvl7pPr marL="2971800" indent="-228600" algn="l" defTabSz="914400" rtl="0" eaLnBrk="1" latinLnBrk="0" hangingPunct="1">
+              <a:lnSpc>
+                <a:spcPct val="90000"/>
+              </a:lnSpc>
+              <a:spcBef>
+                <a:spcPts val="500"/>
+              </a:spcBef>
+              <a:buFont typeface="Arial" panose="020B0604020202020204" pitchFamily="34" charset="0"/>
+              <a:buChar char="•"/>
+              <a:defRPr sz="1800" kern="1200">
+                <a:solidFill>
+                  <a:schemeClr val="tx1"/>
+                </a:solidFill>
+                <a:latin typeface="+mn-lt"/>
+                <a:ea typeface="+mn-ea"/>
+                <a:cs typeface="+mn-cs"/>
+              </a:defRPr>
+            </a:lvl7pPr>
+            <a:lvl8pPr marL="3429000" indent="-228600" algn="l" defTabSz="914400" rtl="0" eaLnBrk="1" latinLnBrk="0" hangingPunct="1">
+              <a:lnSpc>
+                <a:spcPct val="90000"/>
+              </a:lnSpc>
+              <a:spcBef>
+                <a:spcPts val="500"/>
+              </a:spcBef>
+              <a:buFont typeface="Arial" panose="020B0604020202020204" pitchFamily="34" charset="0"/>
+              <a:buChar char="•"/>
+              <a:defRPr sz="1800" kern="1200">
+                <a:solidFill>
+                  <a:schemeClr val="tx1"/>
+                </a:solidFill>
+                <a:latin typeface="+mn-lt"/>
+                <a:ea typeface="+mn-ea"/>
+                <a:cs typeface="+mn-cs"/>
+              </a:defRPr>
+            </a:lvl8pPr>
+            <a:lvl9pPr marL="3886200" indent="-228600" algn="l" defTabSz="914400" rtl="0" eaLnBrk="1" latinLnBrk="0" hangingPunct="1">
+              <a:lnSpc>
+                <a:spcPct val="90000"/>
+              </a:lnSpc>
+              <a:spcBef>
+                <a:spcPts val="500"/>
+              </a:spcBef>
+              <a:buFont typeface="Arial" panose="020B0604020202020204" pitchFamily="34" charset="0"/>
+              <a:buChar char="•"/>
+              <a:defRPr sz="1800" kern="1200">
+                <a:solidFill>
+                  <a:schemeClr val="tx1"/>
+                </a:solidFill>
+                <a:latin typeface="+mn-lt"/>
+                <a:ea typeface="+mn-ea"/>
+                <a:cs typeface="+mn-cs"/>
+              </a:defRPr>
+            </a:lvl9pPr>
+          </a:lstStyle>
+          <a:p>
+            <a:r>
+              <a:rPr lang="en-GB" dirty="0"/>
+              <a:t>Note</a:t>
+            </a:r>
+          </a:p>
+          <a:p>
+            <a:pPr lvl="1"/>
+            <a:r>
+              <a:rPr lang="en-GB" dirty="0"/>
+              <a:t>If same Logging config, the lowest setting will take over for that Logger</a:t>
+            </a:r>
+          </a:p>
+          <a:p>
+            <a:pPr marL="0" indent="0">
+              <a:buFont typeface="Wingdings" panose="05000000000000000000" pitchFamily="2" charset="2"/>
+              <a:buNone/>
+            </a:pPr>
+            <a:endParaRPr lang="en-GB" sz="2200" dirty="0">
+              <a:latin typeface="Courier New" panose="02070309020205020404" pitchFamily="49" charset="0"/>
+              <a:cs typeface="Courier New" panose="02070309020205020404" pitchFamily="49" charset="0"/>
+            </a:endParaRPr>
+          </a:p>
+        </p:txBody>
+      </p:sp>
+    </p:spTree>
+    <p:extLst>
+      <p:ext uri="{BB962C8B-B14F-4D97-AF65-F5344CB8AC3E}">
+        <p14:creationId xmlns:p14="http://schemas.microsoft.com/office/powerpoint/2010/main" val="1293445547"/>
+      </p:ext>
+    </p:extLst>
+  </p:cSld>
+  <p:clrMapOvr>
+    <a:masterClrMapping/>
+  </p:clrMapOvr>
+</p:sld>
+</file>
+
+<file path=ppt/slides/slide8.xml><?xml version="1.0" encoding="utf-8"?>
+<p:sld xmlns:a="http://schemas.openxmlformats.org/drawingml/2006/main" xmlns:r="http://schemas.openxmlformats.org/officeDocument/2006/relationships" xmlns:p="http://schemas.openxmlformats.org/presentationml/2006/main">
+  <p:cSld>
+    <p:spTree>
+      <p:nvGrpSpPr>
+        <p:cNvPr id="1" name=""/>
+        <p:cNvGrpSpPr/>
+        <p:nvPr/>
+      </p:nvGrpSpPr>
+      <p:grpSpPr>
+        <a:xfrm>
+          <a:off x="0" y="0"/>
+          <a:ext cx="0" cy="0"/>
+          <a:chOff x="0" y="0"/>
+          <a:chExt cx="0" cy="0"/>
+        </a:xfrm>
+      </p:grpSpPr>
+      <p:sp>
+        <p:nvSpPr>
+          <p:cNvPr id="2" name="Title 1">
+            <a:extLst>
+              <a:ext uri="{FF2B5EF4-FFF2-40B4-BE49-F238E27FC236}">
+                <a16:creationId xmlns:a16="http://schemas.microsoft.com/office/drawing/2014/main" id="{0BA0FD34-A679-490F-945A-CC620CFEECB3}"/>
+              </a:ext>
+            </a:extLst>
+          </p:cNvPr>
+          <p:cNvSpPr>
+            <a:spLocks noGrp="1"/>
+          </p:cNvSpPr>
+          <p:nvPr>
+            <p:ph type="title"/>
+          </p:nvPr>
+        </p:nvSpPr>
+        <p:spPr/>
+        <p:txBody>
+          <a:bodyPr/>
+          <a:lstStyle/>
+          <a:p>
+            <a:r>
+              <a:rPr lang="en-GB" dirty="0"/>
+              <a:t>Section 3</a:t>
+            </a:r>
+          </a:p>
+        </p:txBody>
+      </p:sp>
+      <p:sp>
+        <p:nvSpPr>
+          <p:cNvPr id="6" name="Content Placeholder 5">
+            <a:extLst>
+              <a:ext uri="{FF2B5EF4-FFF2-40B4-BE49-F238E27FC236}">
+                <a16:creationId xmlns:a16="http://schemas.microsoft.com/office/drawing/2014/main" id="{6784FF90-B334-B589-76D8-FECF2F831659}"/>
+              </a:ext>
+            </a:extLst>
+          </p:cNvPr>
+          <p:cNvSpPr>
+            <a:spLocks noGrp="1"/>
+          </p:cNvSpPr>
+          <p:nvPr>
+            <p:ph idx="1"/>
+          </p:nvPr>
+        </p:nvSpPr>
+        <p:spPr>
+          <a:xfrm>
+            <a:off x="1194356" y="1212115"/>
+            <a:ext cx="4816152" cy="4629153"/>
+          </a:xfrm>
+        </p:spPr>
+        <p:txBody>
+          <a:bodyPr/>
+          <a:lstStyle/>
+          <a:p>
+            <a:r>
+              <a:rPr lang="en-GB" dirty="0"/>
+              <a:t>Structure – part 1</a:t>
+            </a:r>
+          </a:p>
+          <a:p>
+            <a:pPr lvl="1"/>
+            <a:r>
+              <a:rPr lang="en-GB" dirty="0"/>
+              <a:t>List Loggers</a:t>
+            </a:r>
+          </a:p>
+          <a:p>
+            <a:pPr lvl="2"/>
+            <a:r>
+              <a:rPr lang="nl-NL" sz="1600" dirty="0">
+                <a:solidFill>
+                  <a:schemeClr val="bg1"/>
+                </a:solidFill>
+                <a:highlight>
+                  <a:srgbClr val="000000"/>
+                </a:highlight>
+                <a:latin typeface="Courier New" panose="02070309020205020404" pitchFamily="49" charset="0"/>
+                <a:cs typeface="Courier New" panose="02070309020205020404" pitchFamily="49" charset="0"/>
+              </a:rPr>
+              <a:t>[loggers]</a:t>
+            </a:r>
+          </a:p>
+          <a:p>
+            <a:pPr lvl="2"/>
+            <a:r>
+              <a:rPr lang="nl-NL" sz="1600" dirty="0">
+                <a:solidFill>
+                  <a:schemeClr val="accent2"/>
+                </a:solidFill>
+                <a:highlight>
+                  <a:srgbClr val="000000"/>
+                </a:highlight>
+                <a:latin typeface="Courier New" panose="02070309020205020404" pitchFamily="49" charset="0"/>
+                <a:cs typeface="Courier New" panose="02070309020205020404" pitchFamily="49" charset="0"/>
+              </a:rPr>
+              <a:t>keys</a:t>
+            </a:r>
+            <a:r>
+              <a:rPr lang="nl-NL" sz="1600" dirty="0">
+                <a:solidFill>
+                  <a:schemeClr val="bg1"/>
+                </a:solidFill>
+                <a:highlight>
+                  <a:srgbClr val="000000"/>
+                </a:highlight>
+                <a:latin typeface="Courier New" panose="02070309020205020404" pitchFamily="49" charset="0"/>
+                <a:cs typeface="Courier New" panose="02070309020205020404" pitchFamily="49" charset="0"/>
+              </a:rPr>
+              <a:t>=root,Ingest,Persist</a:t>
+            </a:r>
+            <a:endParaRPr lang="en-GB" sz="1600" dirty="0">
+              <a:solidFill>
+                <a:schemeClr val="bg1"/>
+              </a:solidFill>
+              <a:highlight>
+                <a:srgbClr val="000000"/>
+              </a:highlight>
+              <a:latin typeface="Courier New" panose="02070309020205020404" pitchFamily="49" charset="0"/>
+              <a:cs typeface="Courier New" panose="02070309020205020404" pitchFamily="49" charset="0"/>
+            </a:endParaRPr>
+          </a:p>
+          <a:p>
+            <a:pPr lvl="1"/>
+            <a:r>
+              <a:rPr lang="en-GB" dirty="0"/>
+              <a:t>List Handlers (lower level than Loggers)</a:t>
+            </a:r>
+          </a:p>
+          <a:p>
+            <a:pPr lvl="2"/>
+            <a:r>
+              <a:rPr lang="da-DK" sz="1600" dirty="0">
+                <a:solidFill>
+                  <a:schemeClr val="bg1"/>
+                </a:solidFill>
+                <a:highlight>
+                  <a:srgbClr val="000000"/>
+                </a:highlight>
+                <a:latin typeface="Courier New" panose="02070309020205020404" pitchFamily="49" charset="0"/>
+                <a:cs typeface="Courier New" panose="02070309020205020404" pitchFamily="49" charset="0"/>
+              </a:rPr>
+              <a:t>[handlers]</a:t>
+            </a:r>
+          </a:p>
+          <a:p>
+            <a:pPr lvl="2"/>
+            <a:r>
+              <a:rPr lang="da-DK" sz="1600" dirty="0">
+                <a:solidFill>
+                  <a:schemeClr val="accent2"/>
+                </a:solidFill>
+                <a:highlight>
+                  <a:srgbClr val="000000"/>
+                </a:highlight>
+                <a:latin typeface="Courier New" panose="02070309020205020404" pitchFamily="49" charset="0"/>
+                <a:cs typeface="Courier New" panose="02070309020205020404" pitchFamily="49" charset="0"/>
+              </a:rPr>
+              <a:t>keys</a:t>
+            </a:r>
+            <a:r>
+              <a:rPr lang="da-DK" sz="1600" dirty="0">
+                <a:solidFill>
+                  <a:schemeClr val="bg1"/>
+                </a:solidFill>
+                <a:highlight>
+                  <a:srgbClr val="000000"/>
+                </a:highlight>
+                <a:latin typeface="Courier New" panose="02070309020205020404" pitchFamily="49" charset="0"/>
+                <a:cs typeface="Courier New" panose="02070309020205020404" pitchFamily="49" charset="0"/>
+              </a:rPr>
+              <a:t>=consoleHandler</a:t>
+            </a:r>
+          </a:p>
+          <a:p>
+            <a:pPr lvl="2"/>
+            <a:endParaRPr lang="da-DK" dirty="0"/>
+          </a:p>
+          <a:p>
+            <a:pPr lvl="1"/>
+            <a:r>
+              <a:rPr lang="en-GB" dirty="0"/>
+              <a:t>List Formatters (to be used with Loggers or Handlers)</a:t>
+            </a:r>
+          </a:p>
+          <a:p>
+            <a:pPr lvl="2"/>
+            <a:r>
+              <a:rPr lang="da-DK" sz="1600" dirty="0">
+                <a:solidFill>
+                  <a:schemeClr val="bg1"/>
+                </a:solidFill>
+                <a:highlight>
+                  <a:srgbClr val="000000"/>
+                </a:highlight>
+                <a:latin typeface="Courier New" panose="02070309020205020404" pitchFamily="49" charset="0"/>
+                <a:cs typeface="Courier New" panose="02070309020205020404" pitchFamily="49" charset="0"/>
+              </a:rPr>
+              <a:t>[formatters]</a:t>
+            </a:r>
+          </a:p>
+          <a:p>
+            <a:pPr lvl="2"/>
+            <a:r>
+              <a:rPr lang="da-DK" sz="1600" dirty="0">
+                <a:solidFill>
+                  <a:schemeClr val="accent2"/>
+                </a:solidFill>
+                <a:highlight>
+                  <a:srgbClr val="000000"/>
+                </a:highlight>
+                <a:latin typeface="Courier New" panose="02070309020205020404" pitchFamily="49" charset="0"/>
+                <a:cs typeface="Courier New" panose="02070309020205020404" pitchFamily="49" charset="0"/>
+              </a:rPr>
+              <a:t>keys</a:t>
+            </a:r>
+            <a:r>
+              <a:rPr lang="da-DK" sz="1600" dirty="0">
+                <a:solidFill>
+                  <a:schemeClr val="bg1"/>
+                </a:solidFill>
+                <a:highlight>
+                  <a:srgbClr val="000000"/>
+                </a:highlight>
+                <a:latin typeface="Courier New" panose="02070309020205020404" pitchFamily="49" charset="0"/>
+                <a:cs typeface="Courier New" panose="02070309020205020404" pitchFamily="49" charset="0"/>
+              </a:rPr>
+              <a:t>=sampleFormatter</a:t>
+            </a:r>
+            <a:endParaRPr lang="en-GB" sz="1600" dirty="0">
+              <a:solidFill>
+                <a:schemeClr val="bg1"/>
+              </a:solidFill>
+              <a:highlight>
+                <a:srgbClr val="000000"/>
+              </a:highlight>
+              <a:latin typeface="Courier New" panose="02070309020205020404" pitchFamily="49" charset="0"/>
+              <a:cs typeface="Courier New" panose="02070309020205020404" pitchFamily="49" charset="0"/>
+            </a:endParaRPr>
+          </a:p>
+          <a:p>
+            <a:pPr lvl="2"/>
+            <a:endParaRPr lang="en-GB" dirty="0"/>
+          </a:p>
+        </p:txBody>
+      </p:sp>
+      <p:sp>
+        <p:nvSpPr>
+          <p:cNvPr id="5" name="Subtitle 12">
+            <a:extLst>
+              <a:ext uri="{FF2B5EF4-FFF2-40B4-BE49-F238E27FC236}">
+                <a16:creationId xmlns:a16="http://schemas.microsoft.com/office/drawing/2014/main" id="{4056444F-3519-490C-9979-73BA18929113}"/>
+              </a:ext>
+            </a:extLst>
+          </p:cNvPr>
+          <p:cNvSpPr txBox="1">
+            <a:spLocks/>
+          </p:cNvSpPr>
+          <p:nvPr/>
+        </p:nvSpPr>
+        <p:spPr>
+          <a:xfrm>
+            <a:off x="5200650" y="351954"/>
+            <a:ext cx="6121772" cy="387271"/>
+          </a:xfrm>
+          <a:prstGeom prst="rect">
+            <a:avLst/>
+          </a:prstGeom>
+        </p:spPr>
+        <p:txBody>
+          <a:bodyPr/>
+          <a:lstStyle>
+            <a:lvl1pPr marL="228600" indent="-228600" algn="l" defTabSz="914400" rtl="0" eaLnBrk="1" latinLnBrk="0" hangingPunct="1">
+              <a:lnSpc>
+                <a:spcPct val="90000"/>
+              </a:lnSpc>
+              <a:spcBef>
+                <a:spcPts val="1000"/>
+              </a:spcBef>
+              <a:buClr>
+                <a:srgbClr val="34B6B8"/>
+              </a:buClr>
+              <a:buFont typeface="Wingdings" panose="05000000000000000000" pitchFamily="2" charset="2"/>
+              <a:buChar char="§"/>
+              <a:defRPr sz="2800" kern="1200">
+                <a:solidFill>
+                  <a:schemeClr val="tx1"/>
+                </a:solidFill>
+                <a:latin typeface="Abadi Extra Light" panose="020B0204020104020204" pitchFamily="34" charset="0"/>
+                <a:ea typeface="+mn-ea"/>
+                <a:cs typeface="+mn-cs"/>
+              </a:defRPr>
+            </a:lvl1pPr>
+            <a:lvl2pPr marL="685800" indent="-228600" algn="l" defTabSz="914400" rtl="0" eaLnBrk="1" latinLnBrk="0" hangingPunct="1">
+              <a:lnSpc>
+                <a:spcPct val="90000"/>
+              </a:lnSpc>
+              <a:spcBef>
+                <a:spcPts val="500"/>
+              </a:spcBef>
+              <a:buClr>
+                <a:srgbClr val="34B6B8"/>
+              </a:buClr>
+              <a:buFont typeface="Wingdings" panose="05000000000000000000" pitchFamily="2" charset="2"/>
+              <a:buChar char="§"/>
+              <a:defRPr sz="2400" kern="1200">
+                <a:solidFill>
+                  <a:schemeClr val="tx1"/>
+                </a:solidFill>
+                <a:latin typeface="Abadi Extra Light" panose="020B0204020104020204" pitchFamily="34" charset="0"/>
+                <a:ea typeface="+mn-ea"/>
+                <a:cs typeface="+mn-cs"/>
+              </a:defRPr>
+            </a:lvl2pPr>
+            <a:lvl3pPr marL="1143000" indent="-228600" algn="l" defTabSz="914400" rtl="0" eaLnBrk="1" latinLnBrk="0" hangingPunct="1">
+              <a:lnSpc>
+                <a:spcPct val="90000"/>
+              </a:lnSpc>
+              <a:spcBef>
+                <a:spcPts val="500"/>
+              </a:spcBef>
+              <a:buClr>
+                <a:srgbClr val="34B6B8"/>
+              </a:buClr>
+              <a:buFont typeface="Wingdings" panose="05000000000000000000" pitchFamily="2" charset="2"/>
+              <a:buChar char="§"/>
+              <a:defRPr sz="2000" kern="1200">
+                <a:solidFill>
+                  <a:schemeClr val="tx1"/>
+                </a:solidFill>
+                <a:latin typeface="Abadi Extra Light" panose="020B0204020104020204" pitchFamily="34" charset="0"/>
+                <a:ea typeface="+mn-ea"/>
+                <a:cs typeface="+mn-cs"/>
+              </a:defRPr>
+            </a:lvl3pPr>
+            <a:lvl4pPr marL="1600200" indent="-228600" algn="l" defTabSz="914400" rtl="0" eaLnBrk="1" latinLnBrk="0" hangingPunct="1">
+              <a:lnSpc>
+                <a:spcPct val="90000"/>
+              </a:lnSpc>
+              <a:spcBef>
+                <a:spcPts val="500"/>
+              </a:spcBef>
+              <a:buClr>
+                <a:srgbClr val="34B6B8"/>
+              </a:buClr>
+              <a:buFont typeface="Wingdings" panose="05000000000000000000" pitchFamily="2" charset="2"/>
+              <a:buChar char="§"/>
+              <a:defRPr sz="1800" kern="1200">
+                <a:solidFill>
+                  <a:schemeClr val="tx1"/>
+                </a:solidFill>
+                <a:latin typeface="Abadi Extra Light" panose="020B0204020104020204" pitchFamily="34" charset="0"/>
+                <a:ea typeface="+mn-ea"/>
+                <a:cs typeface="+mn-cs"/>
+              </a:defRPr>
+            </a:lvl4pPr>
+            <a:lvl5pPr marL="2057400" indent="-228600" algn="l" defTabSz="914400" rtl="0" eaLnBrk="1" latinLnBrk="0" hangingPunct="1">
+              <a:lnSpc>
+                <a:spcPct val="90000"/>
+              </a:lnSpc>
+              <a:spcBef>
+                <a:spcPts val="500"/>
+              </a:spcBef>
+              <a:buClr>
+                <a:srgbClr val="34B6B8"/>
+              </a:buClr>
+              <a:buFont typeface="Wingdings" panose="05000000000000000000" pitchFamily="2" charset="2"/>
+              <a:buChar char="§"/>
+              <a:defRPr sz="1800" kern="1200">
+                <a:solidFill>
+                  <a:schemeClr val="tx1"/>
+                </a:solidFill>
+                <a:latin typeface="Abadi Extra Light" panose="020B0204020104020204" pitchFamily="34" charset="0"/>
+                <a:ea typeface="+mn-ea"/>
+                <a:cs typeface="+mn-cs"/>
+              </a:defRPr>
+            </a:lvl5pPr>
+            <a:lvl6pPr marL="2514600" indent="-228600" algn="l" defTabSz="914400" rtl="0" eaLnBrk="1" latinLnBrk="0" hangingPunct="1">
+              <a:lnSpc>
+                <a:spcPct val="90000"/>
+              </a:lnSpc>
+              <a:spcBef>
+                <a:spcPts val="500"/>
+              </a:spcBef>
+              <a:buFont typeface="Arial" panose="020B0604020202020204" pitchFamily="34" charset="0"/>
+              <a:buChar char="•"/>
+              <a:defRPr sz="1800" kern="1200">
+                <a:solidFill>
+                  <a:schemeClr val="tx1"/>
+                </a:solidFill>
+                <a:latin typeface="+mn-lt"/>
+                <a:ea typeface="+mn-ea"/>
+                <a:cs typeface="+mn-cs"/>
+              </a:defRPr>
+            </a:lvl6pPr>
+            <a:lvl7pPr marL="2971800" indent="-228600" algn="l" defTabSz="914400" rtl="0" eaLnBrk="1" latinLnBrk="0" hangingPunct="1">
+              <a:lnSpc>
+                <a:spcPct val="90000"/>
+              </a:lnSpc>
+              <a:spcBef>
+                <a:spcPts val="500"/>
+              </a:spcBef>
+              <a:buFont typeface="Arial" panose="020B0604020202020204" pitchFamily="34" charset="0"/>
+              <a:buChar char="•"/>
+              <a:defRPr sz="1800" kern="1200">
+                <a:solidFill>
+                  <a:schemeClr val="tx1"/>
+                </a:solidFill>
+                <a:latin typeface="+mn-lt"/>
+                <a:ea typeface="+mn-ea"/>
+                <a:cs typeface="+mn-cs"/>
+              </a:defRPr>
+            </a:lvl7pPr>
+            <a:lvl8pPr marL="3429000" indent="-228600" algn="l" defTabSz="914400" rtl="0" eaLnBrk="1" latinLnBrk="0" hangingPunct="1">
+              <a:lnSpc>
+                <a:spcPct val="90000"/>
+              </a:lnSpc>
+              <a:spcBef>
+                <a:spcPts val="500"/>
+              </a:spcBef>
+              <a:buFont typeface="Arial" panose="020B0604020202020204" pitchFamily="34" charset="0"/>
+              <a:buChar char="•"/>
+              <a:defRPr sz="1800" kern="1200">
+                <a:solidFill>
+                  <a:schemeClr val="tx1"/>
+                </a:solidFill>
+                <a:latin typeface="+mn-lt"/>
+                <a:ea typeface="+mn-ea"/>
+                <a:cs typeface="+mn-cs"/>
+              </a:defRPr>
+            </a:lvl8pPr>
+            <a:lvl9pPr marL="3886200" indent="-228600" algn="l" defTabSz="914400" rtl="0" eaLnBrk="1" latinLnBrk="0" hangingPunct="1">
+              <a:lnSpc>
+                <a:spcPct val="90000"/>
+              </a:lnSpc>
+              <a:spcBef>
+                <a:spcPts val="500"/>
+              </a:spcBef>
+              <a:buFont typeface="Arial" panose="020B0604020202020204" pitchFamily="34" charset="0"/>
+              <a:buChar char="•"/>
+              <a:defRPr sz="1800" kern="1200">
+                <a:solidFill>
+                  <a:schemeClr val="tx1"/>
+                </a:solidFill>
+                <a:latin typeface="+mn-lt"/>
+                <a:ea typeface="+mn-ea"/>
+                <a:cs typeface="+mn-cs"/>
+              </a:defRPr>
+            </a:lvl9pPr>
+          </a:lstStyle>
+          <a:p>
+            <a:pPr marL="0" indent="0" algn="r">
+              <a:buNone/>
+            </a:pPr>
+            <a:r>
+              <a:rPr lang="en-GB" sz="2400" dirty="0">
+                <a:solidFill>
+                  <a:srgbClr val="A6A7A7"/>
+                </a:solidFill>
+              </a:rPr>
+              <a:t>13. Multiple Loggers &amp; config file structure</a:t>
+            </a:r>
+          </a:p>
+          <a:p>
+            <a:pPr marL="0" indent="0">
+              <a:buNone/>
+            </a:pPr>
+            <a:endParaRPr lang="en-GB" sz="2400" dirty="0">
+              <a:solidFill>
+                <a:srgbClr val="A6A7A7"/>
+              </a:solidFill>
+            </a:endParaRPr>
+          </a:p>
+        </p:txBody>
+      </p:sp>
+      <p:sp>
+        <p:nvSpPr>
+          <p:cNvPr id="7" name="Content Placeholder 5">
+            <a:extLst>
+              <a:ext uri="{FF2B5EF4-FFF2-40B4-BE49-F238E27FC236}">
+                <a16:creationId xmlns:a16="http://schemas.microsoft.com/office/drawing/2014/main" id="{71E9C281-A94F-76A8-F86C-685393332273}"/>
+              </a:ext>
+            </a:extLst>
+          </p:cNvPr>
+          <p:cNvSpPr txBox="1">
+            <a:spLocks/>
+          </p:cNvSpPr>
+          <p:nvPr/>
+        </p:nvSpPr>
+        <p:spPr>
+          <a:xfrm>
+            <a:off x="6258387" y="1212114"/>
+            <a:ext cx="4816152" cy="4629153"/>
+          </a:xfrm>
+          <a:prstGeom prst="rect">
+            <a:avLst/>
+          </a:prstGeom>
+        </p:spPr>
+        <p:txBody>
+          <a:bodyPr/>
+          <a:lstStyle>
+            <a:lvl1pPr marL="228600" indent="-228600" algn="l" defTabSz="914400" rtl="0" eaLnBrk="1" latinLnBrk="0" hangingPunct="1">
+              <a:lnSpc>
+                <a:spcPct val="90000"/>
+              </a:lnSpc>
+              <a:spcBef>
+                <a:spcPts val="1000"/>
+              </a:spcBef>
+              <a:buClr>
+                <a:srgbClr val="34B6B8"/>
+              </a:buClr>
+              <a:buFont typeface="Wingdings" panose="05000000000000000000" pitchFamily="2" charset="2"/>
+              <a:buChar char="§"/>
+              <a:defRPr sz="2800" kern="1200">
+                <a:solidFill>
+                  <a:schemeClr val="tx1"/>
+                </a:solidFill>
+                <a:latin typeface="Abadi Extra Light" panose="020B0204020104020204" pitchFamily="34" charset="0"/>
+                <a:ea typeface="+mn-ea"/>
+                <a:cs typeface="+mn-cs"/>
+              </a:defRPr>
+            </a:lvl1pPr>
+            <a:lvl2pPr marL="685800" indent="-228600" algn="l" defTabSz="914400" rtl="0" eaLnBrk="1" latinLnBrk="0" hangingPunct="1">
+              <a:lnSpc>
+                <a:spcPct val="90000"/>
+              </a:lnSpc>
+              <a:spcBef>
+                <a:spcPts val="500"/>
+              </a:spcBef>
+              <a:buClr>
+                <a:srgbClr val="34B6B8"/>
+              </a:buClr>
+              <a:buFont typeface="Wingdings" panose="05000000000000000000" pitchFamily="2" charset="2"/>
+              <a:buChar char="§"/>
+              <a:defRPr sz="2400" kern="1200">
+                <a:solidFill>
+                  <a:schemeClr val="tx1"/>
+                </a:solidFill>
+                <a:latin typeface="Abadi Extra Light" panose="020B0204020104020204" pitchFamily="34" charset="0"/>
+                <a:ea typeface="+mn-ea"/>
+                <a:cs typeface="+mn-cs"/>
+              </a:defRPr>
+            </a:lvl2pPr>
+            <a:lvl3pPr marL="1143000" indent="-228600" algn="l" defTabSz="914400" rtl="0" eaLnBrk="1" latinLnBrk="0" hangingPunct="1">
+              <a:lnSpc>
+                <a:spcPct val="90000"/>
+              </a:lnSpc>
+              <a:spcBef>
+                <a:spcPts val="500"/>
+              </a:spcBef>
+              <a:buClr>
+                <a:srgbClr val="34B6B8"/>
+              </a:buClr>
+              <a:buFont typeface="Wingdings" panose="05000000000000000000" pitchFamily="2" charset="2"/>
+              <a:buChar char="§"/>
+              <a:defRPr sz="2000" kern="1200">
+                <a:solidFill>
+                  <a:schemeClr val="tx1"/>
+                </a:solidFill>
+                <a:latin typeface="Abadi Extra Light" panose="020B0204020104020204" pitchFamily="34" charset="0"/>
+                <a:ea typeface="+mn-ea"/>
+                <a:cs typeface="+mn-cs"/>
+              </a:defRPr>
+            </a:lvl3pPr>
+            <a:lvl4pPr marL="1600200" indent="-228600" algn="l" defTabSz="914400" rtl="0" eaLnBrk="1" latinLnBrk="0" hangingPunct="1">
+              <a:lnSpc>
+                <a:spcPct val="90000"/>
+              </a:lnSpc>
+              <a:spcBef>
+                <a:spcPts val="500"/>
+              </a:spcBef>
+              <a:buClr>
+                <a:srgbClr val="34B6B8"/>
+              </a:buClr>
+              <a:buFont typeface="Wingdings" panose="05000000000000000000" pitchFamily="2" charset="2"/>
+              <a:buChar char="§"/>
+              <a:defRPr sz="1800" kern="1200">
+                <a:solidFill>
+                  <a:schemeClr val="tx1"/>
+                </a:solidFill>
+                <a:latin typeface="Abadi Extra Light" panose="020B0204020104020204" pitchFamily="34" charset="0"/>
+                <a:ea typeface="+mn-ea"/>
+                <a:cs typeface="+mn-cs"/>
+              </a:defRPr>
+            </a:lvl4pPr>
+            <a:lvl5pPr marL="2057400" indent="-228600" algn="l" defTabSz="914400" rtl="0" eaLnBrk="1" latinLnBrk="0" hangingPunct="1">
+              <a:lnSpc>
+                <a:spcPct val="90000"/>
+              </a:lnSpc>
+              <a:spcBef>
+                <a:spcPts val="500"/>
+              </a:spcBef>
+              <a:buClr>
+                <a:srgbClr val="34B6B8"/>
+              </a:buClr>
+              <a:buFont typeface="Wingdings" panose="05000000000000000000" pitchFamily="2" charset="2"/>
+              <a:buChar char="§"/>
+              <a:defRPr sz="1800" kern="1200">
+                <a:solidFill>
+                  <a:schemeClr val="tx1"/>
+                </a:solidFill>
+                <a:latin typeface="Abadi Extra Light" panose="020B0204020104020204" pitchFamily="34" charset="0"/>
+                <a:ea typeface="+mn-ea"/>
+                <a:cs typeface="+mn-cs"/>
+              </a:defRPr>
+            </a:lvl5pPr>
+            <a:lvl6pPr marL="2514600" indent="-228600" algn="l" defTabSz="914400" rtl="0" eaLnBrk="1" latinLnBrk="0" hangingPunct="1">
+              <a:lnSpc>
+                <a:spcPct val="90000"/>
+              </a:lnSpc>
+              <a:spcBef>
+                <a:spcPts val="500"/>
+              </a:spcBef>
+              <a:buFont typeface="Arial" panose="020B0604020202020204" pitchFamily="34" charset="0"/>
+              <a:buChar char="•"/>
+              <a:defRPr sz="1800" kern="1200">
+                <a:solidFill>
+                  <a:schemeClr val="tx1"/>
+                </a:solidFill>
+                <a:latin typeface="+mn-lt"/>
+                <a:ea typeface="+mn-ea"/>
+                <a:cs typeface="+mn-cs"/>
+              </a:defRPr>
+            </a:lvl6pPr>
+            <a:lvl7pPr marL="2971800" indent="-228600" algn="l" defTabSz="914400" rtl="0" eaLnBrk="1" latinLnBrk="0" hangingPunct="1">
+              <a:lnSpc>
+                <a:spcPct val="90000"/>
+              </a:lnSpc>
+              <a:spcBef>
+                <a:spcPts val="500"/>
+              </a:spcBef>
+              <a:buFont typeface="Arial" panose="020B0604020202020204" pitchFamily="34" charset="0"/>
+              <a:buChar char="•"/>
+              <a:defRPr sz="1800" kern="1200">
+                <a:solidFill>
+                  <a:schemeClr val="tx1"/>
+                </a:solidFill>
+                <a:latin typeface="+mn-lt"/>
+                <a:ea typeface="+mn-ea"/>
+                <a:cs typeface="+mn-cs"/>
+              </a:defRPr>
+            </a:lvl7pPr>
+            <a:lvl8pPr marL="3429000" indent="-228600" algn="l" defTabSz="914400" rtl="0" eaLnBrk="1" latinLnBrk="0" hangingPunct="1">
+              <a:lnSpc>
+                <a:spcPct val="90000"/>
+              </a:lnSpc>
+              <a:spcBef>
+                <a:spcPts val="500"/>
+              </a:spcBef>
+              <a:buFont typeface="Arial" panose="020B0604020202020204" pitchFamily="34" charset="0"/>
+              <a:buChar char="•"/>
+              <a:defRPr sz="1800" kern="1200">
+                <a:solidFill>
+                  <a:schemeClr val="tx1"/>
+                </a:solidFill>
+                <a:latin typeface="+mn-lt"/>
+                <a:ea typeface="+mn-ea"/>
+                <a:cs typeface="+mn-cs"/>
+              </a:defRPr>
+            </a:lvl8pPr>
+            <a:lvl9pPr marL="3886200" indent="-228600" algn="l" defTabSz="914400" rtl="0" eaLnBrk="1" latinLnBrk="0" hangingPunct="1">
+              <a:lnSpc>
+                <a:spcPct val="90000"/>
+              </a:lnSpc>
+              <a:spcBef>
+                <a:spcPts val="500"/>
+              </a:spcBef>
+              <a:buFont typeface="Arial" panose="020B0604020202020204" pitchFamily="34" charset="0"/>
+              <a:buChar char="•"/>
+              <a:defRPr sz="1800" kern="1200">
+                <a:solidFill>
+                  <a:schemeClr val="tx1"/>
+                </a:solidFill>
+                <a:latin typeface="+mn-lt"/>
+                <a:ea typeface="+mn-ea"/>
+                <a:cs typeface="+mn-cs"/>
+              </a:defRPr>
+            </a:lvl9pPr>
+          </a:lstStyle>
+          <a:p>
+            <a:r>
+              <a:rPr lang="en-GB" dirty="0"/>
+              <a:t>Structure – part 2</a:t>
+            </a:r>
+          </a:p>
+          <a:p>
+            <a:pPr lvl="1"/>
+            <a:r>
+              <a:rPr lang="en-GB" dirty="0"/>
+              <a:t>Define Loggers e.g. root, Ingest</a:t>
+            </a:r>
+          </a:p>
+          <a:p>
+            <a:pPr lvl="2"/>
+            <a:r>
+              <a:rPr lang="en-GB" sz="1600" dirty="0">
+                <a:solidFill>
+                  <a:schemeClr val="bg1"/>
+                </a:solidFill>
+                <a:highlight>
+                  <a:srgbClr val="000000"/>
+                </a:highlight>
+                <a:latin typeface="Courier New" panose="02070309020205020404" pitchFamily="49" charset="0"/>
+                <a:cs typeface="Courier New" panose="02070309020205020404" pitchFamily="49" charset="0"/>
+              </a:rPr>
+              <a:t>[</a:t>
+            </a:r>
+            <a:r>
+              <a:rPr lang="en-GB" sz="1600" dirty="0" err="1">
+                <a:solidFill>
+                  <a:schemeClr val="bg1"/>
+                </a:solidFill>
+                <a:highlight>
+                  <a:srgbClr val="000000"/>
+                </a:highlight>
+                <a:latin typeface="Courier New" panose="02070309020205020404" pitchFamily="49" charset="0"/>
+                <a:cs typeface="Courier New" panose="02070309020205020404" pitchFamily="49" charset="0"/>
+              </a:rPr>
+              <a:t>logger_root</a:t>
+            </a:r>
+            <a:r>
+              <a:rPr lang="en-GB" sz="1600" dirty="0">
+                <a:solidFill>
+                  <a:schemeClr val="bg1"/>
+                </a:solidFill>
+                <a:highlight>
+                  <a:srgbClr val="000000"/>
+                </a:highlight>
+                <a:latin typeface="Courier New" panose="02070309020205020404" pitchFamily="49" charset="0"/>
+                <a:cs typeface="Courier New" panose="02070309020205020404" pitchFamily="49" charset="0"/>
+              </a:rPr>
+              <a:t>]</a:t>
+            </a:r>
+          </a:p>
+          <a:p>
+            <a:pPr lvl="2"/>
+            <a:r>
+              <a:rPr lang="en-GB" sz="1600" dirty="0">
+                <a:solidFill>
+                  <a:schemeClr val="bg1"/>
+                </a:solidFill>
+                <a:highlight>
+                  <a:srgbClr val="000000"/>
+                </a:highlight>
+                <a:latin typeface="Courier New" panose="02070309020205020404" pitchFamily="49" charset="0"/>
+                <a:cs typeface="Courier New" panose="02070309020205020404" pitchFamily="49" charset="0"/>
+              </a:rPr>
+              <a:t>level=DEBUG</a:t>
+            </a:r>
+          </a:p>
+          <a:p>
+            <a:pPr lvl="2"/>
+            <a:r>
+              <a:rPr lang="en-GB" sz="1600" dirty="0">
+                <a:solidFill>
+                  <a:schemeClr val="bg1"/>
+                </a:solidFill>
+                <a:highlight>
+                  <a:srgbClr val="000000"/>
+                </a:highlight>
+                <a:latin typeface="Courier New" panose="02070309020205020404" pitchFamily="49" charset="0"/>
+                <a:cs typeface="Courier New" panose="02070309020205020404" pitchFamily="49" charset="0"/>
+              </a:rPr>
+              <a:t>handlers=</a:t>
+            </a:r>
+            <a:r>
+              <a:rPr lang="en-GB" sz="1600" dirty="0" err="1">
+                <a:solidFill>
+                  <a:schemeClr val="bg1"/>
+                </a:solidFill>
+                <a:highlight>
+                  <a:srgbClr val="000000"/>
+                </a:highlight>
+                <a:latin typeface="Courier New" panose="02070309020205020404" pitchFamily="49" charset="0"/>
+                <a:cs typeface="Courier New" panose="02070309020205020404" pitchFamily="49" charset="0"/>
+              </a:rPr>
+              <a:t>consoleHandler</a:t>
+            </a:r>
+            <a:endParaRPr lang="en-GB" sz="1600" dirty="0">
+              <a:solidFill>
+                <a:schemeClr val="bg1"/>
+              </a:solidFill>
+              <a:highlight>
+                <a:srgbClr val="000000"/>
+              </a:highlight>
+              <a:latin typeface="Courier New" panose="02070309020205020404" pitchFamily="49" charset="0"/>
+              <a:cs typeface="Courier New" panose="02070309020205020404" pitchFamily="49" charset="0"/>
+            </a:endParaRPr>
+          </a:p>
+          <a:p>
+            <a:pPr lvl="2"/>
+            <a:endParaRPr lang="en-GB" sz="1600" dirty="0">
+              <a:solidFill>
+                <a:schemeClr val="bg1"/>
+              </a:solidFill>
+              <a:highlight>
+                <a:srgbClr val="000000"/>
+              </a:highlight>
+              <a:latin typeface="Courier New" panose="02070309020205020404" pitchFamily="49" charset="0"/>
+              <a:cs typeface="Courier New" panose="02070309020205020404" pitchFamily="49" charset="0"/>
+            </a:endParaRPr>
+          </a:p>
+          <a:p>
+            <a:pPr lvl="2"/>
+            <a:r>
+              <a:rPr lang="en-GB" sz="1600" dirty="0">
+                <a:solidFill>
+                  <a:schemeClr val="bg1"/>
+                </a:solidFill>
+                <a:highlight>
+                  <a:srgbClr val="000000"/>
+                </a:highlight>
+                <a:latin typeface="Courier New" panose="02070309020205020404" pitchFamily="49" charset="0"/>
+                <a:cs typeface="Courier New" panose="02070309020205020404" pitchFamily="49" charset="0"/>
+              </a:rPr>
+              <a:t>[</a:t>
+            </a:r>
+            <a:r>
+              <a:rPr lang="en-GB" sz="1600" dirty="0" err="1">
+                <a:solidFill>
+                  <a:schemeClr val="bg1"/>
+                </a:solidFill>
+                <a:highlight>
+                  <a:srgbClr val="000000"/>
+                </a:highlight>
+                <a:latin typeface="Courier New" panose="02070309020205020404" pitchFamily="49" charset="0"/>
+                <a:cs typeface="Courier New" panose="02070309020205020404" pitchFamily="49" charset="0"/>
+              </a:rPr>
+              <a:t>logger_Ingest</a:t>
+            </a:r>
+            <a:r>
+              <a:rPr lang="en-GB" sz="1600" dirty="0">
+                <a:solidFill>
+                  <a:schemeClr val="bg1"/>
+                </a:solidFill>
+                <a:highlight>
+                  <a:srgbClr val="000000"/>
+                </a:highlight>
+                <a:latin typeface="Courier New" panose="02070309020205020404" pitchFamily="49" charset="0"/>
+                <a:cs typeface="Courier New" panose="02070309020205020404" pitchFamily="49" charset="0"/>
+              </a:rPr>
+              <a:t>]</a:t>
+            </a:r>
+          </a:p>
+          <a:p>
+            <a:pPr lvl="2"/>
+            <a:r>
+              <a:rPr lang="en-GB" sz="1600" dirty="0">
+                <a:solidFill>
+                  <a:schemeClr val="bg1"/>
+                </a:solidFill>
+                <a:highlight>
+                  <a:srgbClr val="000000"/>
+                </a:highlight>
+                <a:latin typeface="Courier New" panose="02070309020205020404" pitchFamily="49" charset="0"/>
+                <a:cs typeface="Courier New" panose="02070309020205020404" pitchFamily="49" charset="0"/>
+              </a:rPr>
+              <a:t>level=WARNING</a:t>
+            </a:r>
+          </a:p>
+          <a:p>
+            <a:pPr lvl="2"/>
+            <a:r>
+              <a:rPr lang="en-GB" sz="1600" dirty="0">
+                <a:solidFill>
+                  <a:schemeClr val="bg1"/>
+                </a:solidFill>
+                <a:highlight>
+                  <a:srgbClr val="000000"/>
+                </a:highlight>
+                <a:latin typeface="Courier New" panose="02070309020205020404" pitchFamily="49" charset="0"/>
+                <a:cs typeface="Courier New" panose="02070309020205020404" pitchFamily="49" charset="0"/>
+              </a:rPr>
+              <a:t>handlers=</a:t>
+            </a:r>
+            <a:r>
+              <a:rPr lang="en-GB" sz="1600" dirty="0" err="1">
+                <a:solidFill>
+                  <a:schemeClr val="bg1"/>
+                </a:solidFill>
+                <a:highlight>
+                  <a:srgbClr val="000000"/>
+                </a:highlight>
+                <a:latin typeface="Courier New" panose="02070309020205020404" pitchFamily="49" charset="0"/>
+                <a:cs typeface="Courier New" panose="02070309020205020404" pitchFamily="49" charset="0"/>
+              </a:rPr>
+              <a:t>consoleHandler</a:t>
+            </a:r>
+            <a:endParaRPr lang="en-GB" sz="1600" dirty="0">
+              <a:solidFill>
+                <a:schemeClr val="bg1"/>
+              </a:solidFill>
+              <a:highlight>
+                <a:srgbClr val="000000"/>
+              </a:highlight>
+              <a:latin typeface="Courier New" panose="02070309020205020404" pitchFamily="49" charset="0"/>
+              <a:cs typeface="Courier New" panose="02070309020205020404" pitchFamily="49" charset="0"/>
+            </a:endParaRPr>
+          </a:p>
+          <a:p>
+            <a:pPr lvl="2"/>
+            <a:r>
+              <a:rPr lang="en-GB" sz="1600" dirty="0" err="1">
+                <a:solidFill>
+                  <a:schemeClr val="bg1"/>
+                </a:solidFill>
+                <a:highlight>
+                  <a:srgbClr val="000000"/>
+                </a:highlight>
+                <a:latin typeface="Courier New" panose="02070309020205020404" pitchFamily="49" charset="0"/>
+                <a:cs typeface="Courier New" panose="02070309020205020404" pitchFamily="49" charset="0"/>
+              </a:rPr>
+              <a:t>qualname</a:t>
+            </a:r>
+            <a:r>
+              <a:rPr lang="en-GB" sz="1600" dirty="0">
+                <a:solidFill>
+                  <a:schemeClr val="bg1"/>
+                </a:solidFill>
+                <a:highlight>
+                  <a:srgbClr val="000000"/>
+                </a:highlight>
+                <a:latin typeface="Courier New" panose="02070309020205020404" pitchFamily="49" charset="0"/>
+                <a:cs typeface="Courier New" panose="02070309020205020404" pitchFamily="49" charset="0"/>
+              </a:rPr>
+              <a:t>=Ingest</a:t>
+            </a:r>
+          </a:p>
+          <a:p>
+            <a:pPr lvl="2"/>
+            <a:r>
+              <a:rPr lang="en-GB" sz="1600" dirty="0">
+                <a:solidFill>
+                  <a:schemeClr val="bg1"/>
+                </a:solidFill>
+                <a:highlight>
+                  <a:srgbClr val="000000"/>
+                </a:highlight>
+                <a:latin typeface="Courier New" panose="02070309020205020404" pitchFamily="49" charset="0"/>
+                <a:cs typeface="Courier New" panose="02070309020205020404" pitchFamily="49" charset="0"/>
+              </a:rPr>
+              <a:t>propagate=0 * </a:t>
+            </a:r>
+          </a:p>
+          <a:p>
+            <a:pPr lvl="2"/>
+            <a:endParaRPr lang="en-GB" sz="1600" dirty="0">
+              <a:solidFill>
+                <a:schemeClr val="bg1"/>
+              </a:solidFill>
+              <a:highlight>
+                <a:srgbClr val="000000"/>
+              </a:highlight>
+              <a:latin typeface="Courier New" panose="02070309020205020404" pitchFamily="49" charset="0"/>
+              <a:cs typeface="Courier New" panose="02070309020205020404" pitchFamily="49" charset="0"/>
+            </a:endParaRPr>
+          </a:p>
+          <a:p>
+            <a:pPr marL="914400" lvl="2" indent="0">
+              <a:buNone/>
+            </a:pPr>
+            <a:r>
+              <a:rPr lang="en-GB" sz="1600" dirty="0"/>
+              <a:t>* to avoid repetition </a:t>
+            </a:r>
+          </a:p>
+        </p:txBody>
+      </p:sp>
+    </p:spTree>
+    <p:extLst>
+      <p:ext uri="{BB962C8B-B14F-4D97-AF65-F5344CB8AC3E}">
+        <p14:creationId xmlns:p14="http://schemas.microsoft.com/office/powerpoint/2010/main" val="1415855818"/>
+      </p:ext>
+    </p:extLst>
+  </p:cSld>
+  <p:clrMapOvr>
+    <a:masterClrMapping/>
+  </p:clrMapOvr>
+</p:sld>
+</file>
+
+<file path=ppt/slides/slide9.xml><?xml version="1.0" encoding="utf-8"?>
+<p:sld xmlns:a="http://schemas.openxmlformats.org/drawingml/2006/main" xmlns:r="http://schemas.openxmlformats.org/officeDocument/2006/relationships" xmlns:p="http://schemas.openxmlformats.org/presentationml/2006/main">
+  <p:cSld>
+    <p:spTree>
+      <p:nvGrpSpPr>
+        <p:cNvPr id="1" name=""/>
+        <p:cNvGrpSpPr/>
+        <p:nvPr/>
+      </p:nvGrpSpPr>
+      <p:grpSpPr>
+        <a:xfrm>
+          <a:off x="0" y="0"/>
+          <a:ext cx="0" cy="0"/>
+          <a:chOff x="0" y="0"/>
+          <a:chExt cx="0" cy="0"/>
+        </a:xfrm>
+      </p:grpSpPr>
+      <p:sp>
+        <p:nvSpPr>
+          <p:cNvPr id="2" name="Title 1">
+            <a:extLst>
+              <a:ext uri="{FF2B5EF4-FFF2-40B4-BE49-F238E27FC236}">
+                <a16:creationId xmlns:a16="http://schemas.microsoft.com/office/drawing/2014/main" id="{0BA0FD34-A679-490F-945A-CC620CFEECB3}"/>
+              </a:ext>
+            </a:extLst>
+          </p:cNvPr>
+          <p:cNvSpPr>
+            <a:spLocks noGrp="1"/>
+          </p:cNvSpPr>
+          <p:nvPr>
+            <p:ph type="title"/>
+          </p:nvPr>
+        </p:nvSpPr>
+        <p:spPr/>
+        <p:txBody>
+          <a:bodyPr/>
+          <a:lstStyle/>
+          <a:p>
+            <a:r>
+              <a:rPr lang="en-GB" dirty="0"/>
+              <a:t>Section 3</a:t>
+            </a:r>
+          </a:p>
+        </p:txBody>
+      </p:sp>
+      <p:sp>
+        <p:nvSpPr>
+          <p:cNvPr id="6" name="Content Placeholder 5">
+            <a:extLst>
+              <a:ext uri="{FF2B5EF4-FFF2-40B4-BE49-F238E27FC236}">
+                <a16:creationId xmlns:a16="http://schemas.microsoft.com/office/drawing/2014/main" id="{6784FF90-B334-B589-76D8-FECF2F831659}"/>
+              </a:ext>
+            </a:extLst>
+          </p:cNvPr>
+          <p:cNvSpPr>
+            <a:spLocks noGrp="1"/>
+          </p:cNvSpPr>
+          <p:nvPr>
+            <p:ph idx="1"/>
+          </p:nvPr>
+        </p:nvSpPr>
+        <p:spPr>
+          <a:xfrm>
+            <a:off x="1194356" y="1212115"/>
+            <a:ext cx="10001468" cy="4629153"/>
+          </a:xfrm>
+        </p:spPr>
+        <p:txBody>
+          <a:bodyPr/>
+          <a:lstStyle/>
+          <a:p>
+            <a:r>
+              <a:rPr lang="en-GB" dirty="0"/>
+              <a:t>Structure – part 3</a:t>
+            </a:r>
+          </a:p>
+          <a:p>
+            <a:pPr lvl="1"/>
+            <a:r>
+              <a:rPr lang="en-GB" dirty="0"/>
+              <a:t>Define Handlers</a:t>
+            </a:r>
+          </a:p>
+          <a:p>
+            <a:pPr lvl="2"/>
+            <a:r>
+              <a:rPr lang="nl-NL" sz="1600" dirty="0">
+                <a:solidFill>
+                  <a:schemeClr val="bg1"/>
+                </a:solidFill>
+                <a:highlight>
+                  <a:srgbClr val="000000"/>
+                </a:highlight>
+                <a:latin typeface="Courier New" panose="02070309020205020404" pitchFamily="49" charset="0"/>
+                <a:cs typeface="Courier New" panose="02070309020205020404" pitchFamily="49" charset="0"/>
+              </a:rPr>
+              <a:t>[handler_consoleHandler]</a:t>
+            </a:r>
+          </a:p>
+          <a:p>
+            <a:pPr lvl="2"/>
+            <a:r>
+              <a:rPr lang="nl-NL" sz="1600" dirty="0">
+                <a:solidFill>
+                  <a:schemeClr val="bg1"/>
+                </a:solidFill>
+                <a:highlight>
+                  <a:srgbClr val="000000"/>
+                </a:highlight>
+                <a:latin typeface="Courier New" panose="02070309020205020404" pitchFamily="49" charset="0"/>
+                <a:cs typeface="Courier New" panose="02070309020205020404" pitchFamily="49" charset="0"/>
+              </a:rPr>
+              <a:t>class=StreamHandler</a:t>
+            </a:r>
+          </a:p>
+          <a:p>
+            <a:pPr lvl="2"/>
+            <a:r>
+              <a:rPr lang="nl-NL" sz="1600" dirty="0">
+                <a:solidFill>
+                  <a:schemeClr val="bg1"/>
+                </a:solidFill>
+                <a:highlight>
+                  <a:srgbClr val="000000"/>
+                </a:highlight>
+                <a:latin typeface="Courier New" panose="02070309020205020404" pitchFamily="49" charset="0"/>
+                <a:cs typeface="Courier New" panose="02070309020205020404" pitchFamily="49" charset="0"/>
+              </a:rPr>
+              <a:t>level=DEBUG</a:t>
+            </a:r>
+          </a:p>
+          <a:p>
+            <a:pPr lvl="2"/>
+            <a:r>
+              <a:rPr lang="nl-NL" sz="1600" dirty="0">
+                <a:solidFill>
+                  <a:schemeClr val="bg1"/>
+                </a:solidFill>
+                <a:highlight>
+                  <a:srgbClr val="000000"/>
+                </a:highlight>
+                <a:latin typeface="Courier New" panose="02070309020205020404" pitchFamily="49" charset="0"/>
+                <a:cs typeface="Courier New" panose="02070309020205020404" pitchFamily="49" charset="0"/>
+              </a:rPr>
+              <a:t>formatter=sampleFormatter</a:t>
+            </a:r>
+          </a:p>
+          <a:p>
+            <a:pPr lvl="2"/>
+            <a:r>
+              <a:rPr lang="nl-NL" sz="1600" dirty="0">
+                <a:solidFill>
+                  <a:schemeClr val="bg1"/>
+                </a:solidFill>
+                <a:highlight>
+                  <a:srgbClr val="000000"/>
+                </a:highlight>
+                <a:latin typeface="Courier New" panose="02070309020205020404" pitchFamily="49" charset="0"/>
+                <a:cs typeface="Courier New" panose="02070309020205020404" pitchFamily="49" charset="0"/>
+              </a:rPr>
+              <a:t>args=(sys.stdout,)</a:t>
+            </a:r>
+          </a:p>
+          <a:p>
+            <a:pPr lvl="2"/>
+            <a:endParaRPr lang="en-GB" sz="1600" dirty="0">
+              <a:solidFill>
+                <a:schemeClr val="bg1"/>
+              </a:solidFill>
+              <a:highlight>
+                <a:srgbClr val="000000"/>
+              </a:highlight>
+              <a:latin typeface="Courier New" panose="02070309020205020404" pitchFamily="49" charset="0"/>
+              <a:cs typeface="Courier New" panose="02070309020205020404" pitchFamily="49" charset="0"/>
+            </a:endParaRPr>
+          </a:p>
+          <a:p>
+            <a:pPr lvl="1"/>
+            <a:r>
+              <a:rPr lang="en-GB" dirty="0"/>
+              <a:t>Define Formatters (to be used with Loggers or Handlers)</a:t>
+            </a:r>
+          </a:p>
+          <a:p>
+            <a:pPr lvl="2"/>
+            <a:r>
+              <a:rPr lang="en-US" sz="1600" dirty="0">
+                <a:solidFill>
+                  <a:schemeClr val="bg1"/>
+                </a:solidFill>
+                <a:highlight>
+                  <a:srgbClr val="000000"/>
+                </a:highlight>
+                <a:latin typeface="Courier New" panose="02070309020205020404" pitchFamily="49" charset="0"/>
+                <a:cs typeface="Courier New" panose="02070309020205020404" pitchFamily="49" charset="0"/>
+              </a:rPr>
+              <a:t>[</a:t>
+            </a:r>
+            <a:r>
+              <a:rPr lang="en-US" sz="1600" dirty="0" err="1">
+                <a:solidFill>
+                  <a:schemeClr val="bg1"/>
+                </a:solidFill>
+                <a:highlight>
+                  <a:srgbClr val="000000"/>
+                </a:highlight>
+                <a:latin typeface="Courier New" panose="02070309020205020404" pitchFamily="49" charset="0"/>
+                <a:cs typeface="Courier New" panose="02070309020205020404" pitchFamily="49" charset="0"/>
+              </a:rPr>
+              <a:t>formatter_sampleFormatter</a:t>
+            </a:r>
+            <a:r>
+              <a:rPr lang="en-US" sz="1600" dirty="0">
+                <a:solidFill>
+                  <a:schemeClr val="bg1"/>
+                </a:solidFill>
+                <a:highlight>
+                  <a:srgbClr val="000000"/>
+                </a:highlight>
+                <a:latin typeface="Courier New" panose="02070309020205020404" pitchFamily="49" charset="0"/>
+                <a:cs typeface="Courier New" panose="02070309020205020404" pitchFamily="49" charset="0"/>
+              </a:rPr>
+              <a:t>]</a:t>
+            </a:r>
+          </a:p>
+          <a:p>
+            <a:pPr lvl="2"/>
+            <a:r>
+              <a:rPr lang="en-US" sz="1600" dirty="0">
+                <a:solidFill>
+                  <a:schemeClr val="bg1"/>
+                </a:solidFill>
+                <a:highlight>
+                  <a:srgbClr val="000000"/>
+                </a:highlight>
+                <a:latin typeface="Courier New" panose="02070309020205020404" pitchFamily="49" charset="0"/>
+                <a:cs typeface="Courier New" panose="02070309020205020404" pitchFamily="49" charset="0"/>
+              </a:rPr>
+              <a:t>format=%(</a:t>
+            </a:r>
+            <a:r>
+              <a:rPr lang="en-US" sz="1600" dirty="0" err="1">
+                <a:solidFill>
+                  <a:schemeClr val="bg1"/>
+                </a:solidFill>
+                <a:highlight>
+                  <a:srgbClr val="000000"/>
+                </a:highlight>
+                <a:latin typeface="Courier New" panose="02070309020205020404" pitchFamily="49" charset="0"/>
+                <a:cs typeface="Courier New" panose="02070309020205020404" pitchFamily="49" charset="0"/>
+              </a:rPr>
+              <a:t>asctime</a:t>
+            </a:r>
+            <a:r>
+              <a:rPr lang="en-US" sz="1600" dirty="0">
+                <a:solidFill>
+                  <a:schemeClr val="bg1"/>
+                </a:solidFill>
+                <a:highlight>
+                  <a:srgbClr val="000000"/>
+                </a:highlight>
+                <a:latin typeface="Courier New" panose="02070309020205020404" pitchFamily="49" charset="0"/>
+                <a:cs typeface="Courier New" panose="02070309020205020404" pitchFamily="49" charset="0"/>
+              </a:rPr>
+              <a:t>)s - %(name)s - %(</a:t>
+            </a:r>
+            <a:r>
+              <a:rPr lang="en-US" sz="1600" dirty="0" err="1">
+                <a:solidFill>
+                  <a:schemeClr val="bg1"/>
+                </a:solidFill>
+                <a:highlight>
+                  <a:srgbClr val="000000"/>
+                </a:highlight>
+                <a:latin typeface="Courier New" panose="02070309020205020404" pitchFamily="49" charset="0"/>
+                <a:cs typeface="Courier New" panose="02070309020205020404" pitchFamily="49" charset="0"/>
+              </a:rPr>
+              <a:t>levelname</a:t>
+            </a:r>
+            <a:r>
+              <a:rPr lang="en-US" sz="1600" dirty="0">
+                <a:solidFill>
+                  <a:schemeClr val="bg1"/>
+                </a:solidFill>
+                <a:highlight>
+                  <a:srgbClr val="000000"/>
+                </a:highlight>
+                <a:latin typeface="Courier New" panose="02070309020205020404" pitchFamily="49" charset="0"/>
+                <a:cs typeface="Courier New" panose="02070309020205020404" pitchFamily="49" charset="0"/>
+              </a:rPr>
+              <a:t>)s - %(message)s</a:t>
+            </a:r>
+            <a:endParaRPr lang="da-DK" sz="1600" dirty="0">
+              <a:solidFill>
+                <a:schemeClr val="bg1"/>
+              </a:solidFill>
+              <a:highlight>
+                <a:srgbClr val="000000"/>
+              </a:highlight>
+              <a:latin typeface="Courier New" panose="02070309020205020404" pitchFamily="49" charset="0"/>
+              <a:cs typeface="Courier New" panose="02070309020205020404" pitchFamily="49" charset="0"/>
+            </a:endParaRPr>
+          </a:p>
+        </p:txBody>
+      </p:sp>
+      <p:sp>
+        <p:nvSpPr>
+          <p:cNvPr id="5" name="Subtitle 12">
+            <a:extLst>
+              <a:ext uri="{FF2B5EF4-FFF2-40B4-BE49-F238E27FC236}">
+                <a16:creationId xmlns:a16="http://schemas.microsoft.com/office/drawing/2014/main" id="{4056444F-3519-490C-9979-73BA18929113}"/>
+              </a:ext>
+            </a:extLst>
+          </p:cNvPr>
+          <p:cNvSpPr txBox="1">
+            <a:spLocks/>
+          </p:cNvSpPr>
+          <p:nvPr/>
+        </p:nvSpPr>
+        <p:spPr>
+          <a:xfrm>
+            <a:off x="3189249" y="351954"/>
+            <a:ext cx="8133173" cy="387271"/>
+          </a:xfrm>
+          <a:prstGeom prst="rect">
+            <a:avLst/>
+          </a:prstGeom>
+        </p:spPr>
+        <p:txBody>
+          <a:bodyPr/>
+          <a:lstStyle>
+            <a:lvl1pPr marL="228600" indent="-228600" algn="l" defTabSz="914400" rtl="0" eaLnBrk="1" latinLnBrk="0" hangingPunct="1">
+              <a:lnSpc>
+                <a:spcPct val="90000"/>
+              </a:lnSpc>
+              <a:spcBef>
+                <a:spcPts val="1000"/>
+              </a:spcBef>
+              <a:buClr>
+                <a:srgbClr val="34B6B8"/>
+              </a:buClr>
+              <a:buFont typeface="Wingdings" panose="05000000000000000000" pitchFamily="2" charset="2"/>
+              <a:buChar char="§"/>
+              <a:defRPr sz="2800" kern="1200">
+                <a:solidFill>
+                  <a:schemeClr val="tx1"/>
+                </a:solidFill>
+                <a:latin typeface="Abadi Extra Light" panose="020B0204020104020204" pitchFamily="34" charset="0"/>
+                <a:ea typeface="+mn-ea"/>
+                <a:cs typeface="+mn-cs"/>
+              </a:defRPr>
+            </a:lvl1pPr>
+            <a:lvl2pPr marL="685800" indent="-228600" algn="l" defTabSz="914400" rtl="0" eaLnBrk="1" latinLnBrk="0" hangingPunct="1">
+              <a:lnSpc>
+                <a:spcPct val="90000"/>
+              </a:lnSpc>
+              <a:spcBef>
+                <a:spcPts val="500"/>
+              </a:spcBef>
+              <a:buClr>
+                <a:srgbClr val="34B6B8"/>
+              </a:buClr>
+              <a:buFont typeface="Wingdings" panose="05000000000000000000" pitchFamily="2" charset="2"/>
+              <a:buChar char="§"/>
+              <a:defRPr sz="2400" kern="1200">
+                <a:solidFill>
+                  <a:schemeClr val="tx1"/>
+                </a:solidFill>
+                <a:latin typeface="Abadi Extra Light" panose="020B0204020104020204" pitchFamily="34" charset="0"/>
+                <a:ea typeface="+mn-ea"/>
+                <a:cs typeface="+mn-cs"/>
+              </a:defRPr>
+            </a:lvl2pPr>
+            <a:lvl3pPr marL="1143000" indent="-228600" algn="l" defTabSz="914400" rtl="0" eaLnBrk="1" latinLnBrk="0" hangingPunct="1">
+              <a:lnSpc>
+                <a:spcPct val="90000"/>
+              </a:lnSpc>
+              <a:spcBef>
+                <a:spcPts val="500"/>
+              </a:spcBef>
+              <a:buClr>
+                <a:srgbClr val="34B6B8"/>
+              </a:buClr>
+              <a:buFont typeface="Wingdings" panose="05000000000000000000" pitchFamily="2" charset="2"/>
+              <a:buChar char="§"/>
+              <a:defRPr sz="2000" kern="1200">
+                <a:solidFill>
+                  <a:schemeClr val="tx1"/>
+                </a:solidFill>
+                <a:latin typeface="Abadi Extra Light" panose="020B0204020104020204" pitchFamily="34" charset="0"/>
+                <a:ea typeface="+mn-ea"/>
+                <a:cs typeface="+mn-cs"/>
+              </a:defRPr>
+            </a:lvl3pPr>
+            <a:lvl4pPr marL="1600200" indent="-228600" algn="l" defTabSz="914400" rtl="0" eaLnBrk="1" latinLnBrk="0" hangingPunct="1">
+              <a:lnSpc>
+                <a:spcPct val="90000"/>
+              </a:lnSpc>
+              <a:spcBef>
+                <a:spcPts val="500"/>
+              </a:spcBef>
+              <a:buClr>
+                <a:srgbClr val="34B6B8"/>
+              </a:buClr>
+              <a:buFont typeface="Wingdings" panose="05000000000000000000" pitchFamily="2" charset="2"/>
+              <a:buChar char="§"/>
+              <a:defRPr sz="1800" kern="1200">
+                <a:solidFill>
+                  <a:schemeClr val="tx1"/>
+                </a:solidFill>
+                <a:latin typeface="Abadi Extra Light" panose="020B0204020104020204" pitchFamily="34" charset="0"/>
+                <a:ea typeface="+mn-ea"/>
+                <a:cs typeface="+mn-cs"/>
+              </a:defRPr>
+            </a:lvl4pPr>
+            <a:lvl5pPr marL="2057400" indent="-228600" algn="l" defTabSz="914400" rtl="0" eaLnBrk="1" latinLnBrk="0" hangingPunct="1">
+              <a:lnSpc>
+                <a:spcPct val="90000"/>
+              </a:lnSpc>
+              <a:spcBef>
+                <a:spcPts val="500"/>
+              </a:spcBef>
+              <a:buClr>
+                <a:srgbClr val="34B6B8"/>
+              </a:buClr>
+              <a:buFont typeface="Wingdings" panose="05000000000000000000" pitchFamily="2" charset="2"/>
+              <a:buChar char="§"/>
+              <a:defRPr sz="1800" kern="1200">
+                <a:solidFill>
+                  <a:schemeClr val="tx1"/>
+                </a:solidFill>
+                <a:latin typeface="Abadi Extra Light" panose="020B0204020104020204" pitchFamily="34" charset="0"/>
+                <a:ea typeface="+mn-ea"/>
+                <a:cs typeface="+mn-cs"/>
+              </a:defRPr>
+            </a:lvl5pPr>
+            <a:lvl6pPr marL="2514600" indent="-228600" algn="l" defTabSz="914400" rtl="0" eaLnBrk="1" latinLnBrk="0" hangingPunct="1">
+              <a:lnSpc>
+                <a:spcPct val="90000"/>
+              </a:lnSpc>
+              <a:spcBef>
+                <a:spcPts val="500"/>
+              </a:spcBef>
+              <a:buFont typeface="Arial" panose="020B0604020202020204" pitchFamily="34" charset="0"/>
+              <a:buChar char="•"/>
+              <a:defRPr sz="1800" kern="1200">
+                <a:solidFill>
+                  <a:schemeClr val="tx1"/>
+                </a:solidFill>
+                <a:latin typeface="+mn-lt"/>
+                <a:ea typeface="+mn-ea"/>
+                <a:cs typeface="+mn-cs"/>
+              </a:defRPr>
+            </a:lvl6pPr>
+            <a:lvl7pPr marL="2971800" indent="-228600" algn="l" defTabSz="914400" rtl="0" eaLnBrk="1" latinLnBrk="0" hangingPunct="1">
+              <a:lnSpc>
+                <a:spcPct val="90000"/>
+              </a:lnSpc>
+              <a:spcBef>
+                <a:spcPts val="500"/>
+              </a:spcBef>
+              <a:buFont typeface="Arial" panose="020B0604020202020204" pitchFamily="34" charset="0"/>
+              <a:buChar char="•"/>
+              <a:defRPr sz="1800" kern="1200">
+                <a:solidFill>
+                  <a:schemeClr val="tx1"/>
+                </a:solidFill>
+                <a:latin typeface="+mn-lt"/>
+                <a:ea typeface="+mn-ea"/>
+                <a:cs typeface="+mn-cs"/>
+              </a:defRPr>
+            </a:lvl7pPr>
+            <a:lvl8pPr marL="3429000" indent="-228600" algn="l" defTabSz="914400" rtl="0" eaLnBrk="1" latinLnBrk="0" hangingPunct="1">
+              <a:lnSpc>
+                <a:spcPct val="90000"/>
+              </a:lnSpc>
+              <a:spcBef>
+                <a:spcPts val="500"/>
+              </a:spcBef>
+              <a:buFont typeface="Arial" panose="020B0604020202020204" pitchFamily="34" charset="0"/>
+              <a:buChar char="•"/>
+              <a:defRPr sz="1800" kern="1200">
+                <a:solidFill>
+                  <a:schemeClr val="tx1"/>
+                </a:solidFill>
+                <a:latin typeface="+mn-lt"/>
+                <a:ea typeface="+mn-ea"/>
+                <a:cs typeface="+mn-cs"/>
+              </a:defRPr>
+            </a:lvl8pPr>
+            <a:lvl9pPr marL="3886200" indent="-228600" algn="l" defTabSz="914400" rtl="0" eaLnBrk="1" latinLnBrk="0" hangingPunct="1">
+              <a:lnSpc>
+                <a:spcPct val="90000"/>
+              </a:lnSpc>
+              <a:spcBef>
+                <a:spcPts val="500"/>
+              </a:spcBef>
+              <a:buFont typeface="Arial" panose="020B0604020202020204" pitchFamily="34" charset="0"/>
+              <a:buChar char="•"/>
+              <a:defRPr sz="1800" kern="1200">
+                <a:solidFill>
+                  <a:schemeClr val="tx1"/>
+                </a:solidFill>
+                <a:latin typeface="+mn-lt"/>
+                <a:ea typeface="+mn-ea"/>
+                <a:cs typeface="+mn-cs"/>
+              </a:defRPr>
+            </a:lvl9pPr>
+          </a:lstStyle>
+          <a:p>
+            <a:pPr marL="0" indent="0" algn="r">
+              <a:buNone/>
+            </a:pPr>
+            <a:r>
+              <a:rPr lang="en-GB" sz="2400" dirty="0">
+                <a:solidFill>
+                  <a:srgbClr val="A6A7A7"/>
+                </a:solidFill>
+              </a:rPr>
+              <a:t>13. Multiple Loggers &amp; config file structure (continued)</a:t>
+            </a:r>
+          </a:p>
+          <a:p>
+            <a:pPr marL="0" indent="0">
+              <a:buNone/>
+            </a:pPr>
+            <a:endParaRPr lang="en-GB" sz="2400" dirty="0">
+              <a:solidFill>
+                <a:srgbClr val="A6A7A7"/>
+              </a:solidFill>
+            </a:endParaRPr>
+          </a:p>
+        </p:txBody>
+      </p:sp>
+    </p:spTree>
+    <p:extLst>
+      <p:ext uri="{BB962C8B-B14F-4D97-AF65-F5344CB8AC3E}">
+        <p14:creationId xmlns:p14="http://schemas.microsoft.com/office/powerpoint/2010/main" val="1328277033"/>
       </p:ext>
     </p:extLst>
   </p:cSld>

</xml_diff>

<commit_message>
Still trying to figure out correct python version and why psycopg2 doesn't work
</commit_message>
<xml_diff>
--- a/python-coding-framework-diagrams-and-documentation.pptx
+++ b/python-coding-framework-diagrams-and-documentation.pptx
@@ -208,7 +208,7 @@
           <a:p>
             <a:fld id="{0D2BE958-CCE6-4EBA-9C92-EAE784A9D90D}" type="datetimeFigureOut">
               <a:rPr lang="en-GB" smtClean="0"/>
-              <a:t>25/07/2022</a:t>
+              <a:t>05/09/2022</a:t>
             </a:fld>
             <a:endParaRPr lang="en-GB"/>
           </a:p>
@@ -1903,7 +1903,7 @@
             <a:fld id="{1CBE1E4D-7CC0-45A9-A56C-EF1CE89C88B7}" type="datetimeFigureOut">
               <a:rPr lang="en-GB" smtClean="0"/>
               <a:pPr/>
-              <a:t>25/07/2022</a:t>
+              <a:t>05/09/2022</a:t>
             </a:fld>
             <a:endParaRPr lang="en-GB"/>
           </a:p>
@@ -3425,7 +3425,7 @@
           <a:p>
             <a:fld id="{D3D47D9D-6331-42FA-BA57-EFFB8A18CF9C}" type="datetime1">
               <a:rPr lang="en-GB" smtClean="0"/>
-              <a:t>25/07/2022</a:t>
+              <a:t>05/09/2022</a:t>
             </a:fld>
             <a:endParaRPr lang="en-GB" dirty="0"/>
           </a:p>

</xml_diff>